<commit_message>
All slides are finished
</commit_message>
<xml_diff>
--- a/MultithreadingWithQt.pptx
+++ b/MultithreadingWithQt.pptx
@@ -6694,15 +6694,7 @@
           <a:p>
             <a:r>
               <a:rPr lang="en-US" dirty="0" smtClean="0"/>
-              <a:t>Example: </a:t>
-            </a:r>
-            <a:r>
-              <a:rPr lang="en-US" dirty="0" err="1" smtClean="0"/>
-              <a:t>QThread</a:t>
-            </a:r>
-            <a:r>
-              <a:rPr lang="en-US" dirty="0" smtClean="0"/>
-              <a:t> Subclass</a:t>
+              <a:t>Example: QThread Subclass</a:t>
             </a:r>
             <a:endParaRPr lang="en-US" dirty="0"/>
           </a:p>
@@ -6786,6 +6778,247 @@
           </a:prstGeom>
         </p:spPr>
       </p:pic>
+      <p:cxnSp>
+        <p:nvCxnSpPr>
+          <p:cNvPr id="8" name="Straight Arrow Connector 7"/>
+          <p:cNvCxnSpPr/>
+          <p:nvPr/>
+        </p:nvCxnSpPr>
+        <p:spPr>
+          <a:xfrm flipH="1">
+            <a:off x="2977506" y="2292548"/>
+            <a:ext cx="1531330" cy="1108941"/>
+          </a:xfrm>
+          <a:prstGeom prst="straightConnector1">
+            <a:avLst/>
+          </a:prstGeom>
+          <a:ln>
+            <a:tailEnd type="triangle"/>
+          </a:ln>
+        </p:spPr>
+        <p:style>
+          <a:lnRef idx="3">
+            <a:schemeClr val="accent1"/>
+          </a:lnRef>
+          <a:fillRef idx="0">
+            <a:schemeClr val="accent1"/>
+          </a:fillRef>
+          <a:effectRef idx="2">
+            <a:schemeClr val="accent1"/>
+          </a:effectRef>
+          <a:fontRef idx="minor">
+            <a:schemeClr val="tx1"/>
+          </a:fontRef>
+        </p:style>
+      </p:cxnSp>
+      <p:cxnSp>
+        <p:nvCxnSpPr>
+          <p:cNvPr id="12" name="Straight Arrow Connector 11"/>
+          <p:cNvCxnSpPr/>
+          <p:nvPr/>
+        </p:nvCxnSpPr>
+        <p:spPr>
+          <a:xfrm flipH="1">
+            <a:off x="9086852" y="3253778"/>
+            <a:ext cx="1313968" cy="894149"/>
+          </a:xfrm>
+          <a:prstGeom prst="straightConnector1">
+            <a:avLst/>
+          </a:prstGeom>
+          <a:ln>
+            <a:tailEnd type="triangle"/>
+          </a:ln>
+        </p:spPr>
+        <p:style>
+          <a:lnRef idx="3">
+            <a:schemeClr val="accent1"/>
+          </a:lnRef>
+          <a:fillRef idx="0">
+            <a:schemeClr val="accent1"/>
+          </a:fillRef>
+          <a:effectRef idx="2">
+            <a:schemeClr val="accent1"/>
+          </a:effectRef>
+          <a:fontRef idx="minor">
+            <a:schemeClr val="tx1"/>
+          </a:fontRef>
+        </p:style>
+      </p:cxnSp>
+      <p:sp>
+        <p:nvSpPr>
+          <p:cNvPr id="11" name="TextBox 10"/>
+          <p:cNvSpPr txBox="1"/>
+          <p:nvPr/>
+        </p:nvSpPr>
+        <p:spPr>
+          <a:xfrm>
+            <a:off x="9390191" y="2817360"/>
+            <a:ext cx="2021259" cy="646331"/>
+          </a:xfrm>
+          <a:prstGeom prst="rect">
+            <a:avLst/>
+          </a:prstGeom>
+          <a:solidFill>
+            <a:schemeClr val="accent1"/>
+          </a:solidFill>
+        </p:spPr>
+        <p:txBody>
+          <a:bodyPr wrap="square" rtlCol="0">
+            <a:spAutoFit/>
+          </a:bodyPr>
+          <a:lstStyle/>
+          <a:p>
+            <a:r>
+              <a:rPr lang="en-US" b="1" dirty="0" smtClean="0">
+                <a:solidFill>
+                  <a:schemeClr val="bg2">
+                    <a:lumMod val="50000"/>
+                  </a:schemeClr>
+                </a:solidFill>
+              </a:rPr>
+              <a:t>Starts run() on new thread</a:t>
+            </a:r>
+            <a:endParaRPr lang="en-US" b="1" dirty="0">
+              <a:solidFill>
+                <a:schemeClr val="bg2">
+                  <a:lumMod val="50000"/>
+                </a:schemeClr>
+              </a:solidFill>
+            </a:endParaRPr>
+          </a:p>
+        </p:txBody>
+      </p:sp>
+      <p:sp>
+        <p:nvSpPr>
+          <p:cNvPr id="17" name="TextBox 16"/>
+          <p:cNvSpPr txBox="1"/>
+          <p:nvPr/>
+        </p:nvSpPr>
+        <p:spPr>
+          <a:xfrm>
+            <a:off x="3498207" y="1852758"/>
+            <a:ext cx="2021259" cy="646331"/>
+          </a:xfrm>
+          <a:prstGeom prst="rect">
+            <a:avLst/>
+          </a:prstGeom>
+          <a:solidFill>
+            <a:schemeClr val="accent1"/>
+          </a:solidFill>
+        </p:spPr>
+        <p:txBody>
+          <a:bodyPr wrap="square" rtlCol="0">
+            <a:spAutoFit/>
+          </a:bodyPr>
+          <a:lstStyle/>
+          <a:p>
+            <a:r>
+              <a:rPr lang="en-US" b="1" dirty="0" err="1" smtClean="0">
+                <a:solidFill>
+                  <a:schemeClr val="bg2">
+                    <a:lumMod val="50000"/>
+                  </a:schemeClr>
+                </a:solidFill>
+              </a:rPr>
+              <a:t>Reimplemented</a:t>
+            </a:r>
+            <a:r>
+              <a:rPr lang="en-US" b="1" dirty="0" smtClean="0">
+                <a:solidFill>
+                  <a:schemeClr val="bg2">
+                    <a:lumMod val="50000"/>
+                  </a:schemeClr>
+                </a:solidFill>
+              </a:rPr>
+              <a:t> run()</a:t>
+            </a:r>
+            <a:endParaRPr lang="en-US" b="1" dirty="0">
+              <a:solidFill>
+                <a:schemeClr val="bg2">
+                  <a:lumMod val="50000"/>
+                </a:schemeClr>
+              </a:solidFill>
+            </a:endParaRPr>
+          </a:p>
+        </p:txBody>
+      </p:sp>
+      <p:cxnSp>
+        <p:nvCxnSpPr>
+          <p:cNvPr id="20" name="Straight Arrow Connector 19"/>
+          <p:cNvCxnSpPr/>
+          <p:nvPr/>
+        </p:nvCxnSpPr>
+        <p:spPr>
+          <a:xfrm flipH="1" flipV="1">
+            <a:off x="8778240" y="5548457"/>
+            <a:ext cx="1284026" cy="504182"/>
+          </a:xfrm>
+          <a:prstGeom prst="straightConnector1">
+            <a:avLst/>
+          </a:prstGeom>
+          <a:ln>
+            <a:tailEnd type="triangle"/>
+          </a:ln>
+        </p:spPr>
+        <p:style>
+          <a:lnRef idx="3">
+            <a:schemeClr val="accent1"/>
+          </a:lnRef>
+          <a:fillRef idx="0">
+            <a:schemeClr val="accent1"/>
+          </a:fillRef>
+          <a:effectRef idx="2">
+            <a:schemeClr val="accent1"/>
+          </a:effectRef>
+          <a:fontRef idx="minor">
+            <a:schemeClr val="tx1"/>
+          </a:fontRef>
+        </p:style>
+      </p:cxnSp>
+      <p:sp>
+        <p:nvSpPr>
+          <p:cNvPr id="19" name="TextBox 18"/>
+          <p:cNvSpPr txBox="1"/>
+          <p:nvPr/>
+        </p:nvSpPr>
+        <p:spPr>
+          <a:xfrm>
+            <a:off x="9743836" y="5476066"/>
+            <a:ext cx="2021259" cy="1200329"/>
+          </a:xfrm>
+          <a:prstGeom prst="rect">
+            <a:avLst/>
+          </a:prstGeom>
+          <a:solidFill>
+            <a:schemeClr val="accent1"/>
+          </a:solidFill>
+        </p:spPr>
+        <p:txBody>
+          <a:bodyPr wrap="square" rtlCol="0">
+            <a:spAutoFit/>
+          </a:bodyPr>
+          <a:lstStyle/>
+          <a:p>
+            <a:r>
+              <a:rPr lang="en-US" b="1" dirty="0" smtClean="0">
+                <a:solidFill>
+                  <a:schemeClr val="bg2">
+                    <a:lumMod val="50000"/>
+                  </a:schemeClr>
+                </a:solidFill>
+              </a:rPr>
+              <a:t>Main thread waits for subclass thread to finish</a:t>
+            </a:r>
+            <a:endParaRPr lang="en-US" b="1" dirty="0">
+              <a:solidFill>
+                <a:schemeClr val="bg2">
+                  <a:lumMod val="50000"/>
+                </a:schemeClr>
+              </a:solidFill>
+            </a:endParaRPr>
+          </a:p>
+        </p:txBody>
+      </p:sp>
     </p:spTree>
     <p:extLst>
       <p:ext uri="{BB962C8B-B14F-4D97-AF65-F5344CB8AC3E}">
@@ -6840,15 +7073,7 @@
           <a:p>
             <a:r>
               <a:rPr lang="en-US" dirty="0"/>
-              <a:t>Example: </a:t>
-            </a:r>
-            <a:r>
-              <a:rPr lang="en-US" dirty="0" err="1"/>
-              <a:t>QThread</a:t>
-            </a:r>
-            <a:r>
-              <a:rPr lang="en-US" dirty="0"/>
-              <a:t> </a:t>
+              <a:t>Example: QThread </a:t>
             </a:r>
             <a:r>
               <a:rPr lang="en-US" dirty="0" smtClean="0"/>
@@ -6903,6 +7128,420 @@
           <a:lstStyle/>
           <a:p>
             <a:endParaRPr lang="en-US"/>
+          </a:p>
+        </p:txBody>
+      </p:sp>
+      <p:cxnSp>
+        <p:nvCxnSpPr>
+          <p:cNvPr id="13" name="Straight Arrow Connector 12"/>
+          <p:cNvCxnSpPr/>
+          <p:nvPr/>
+        </p:nvCxnSpPr>
+        <p:spPr>
+          <a:xfrm>
+            <a:off x="2795052" y="1963883"/>
+            <a:ext cx="1696938" cy="127807"/>
+          </a:xfrm>
+          <a:prstGeom prst="straightConnector1">
+            <a:avLst/>
+          </a:prstGeom>
+          <a:ln>
+            <a:tailEnd type="triangle"/>
+          </a:ln>
+        </p:spPr>
+        <p:style>
+          <a:lnRef idx="3">
+            <a:schemeClr val="accent1"/>
+          </a:lnRef>
+          <a:fillRef idx="0">
+            <a:schemeClr val="accent1"/>
+          </a:fillRef>
+          <a:effectRef idx="2">
+            <a:schemeClr val="accent1"/>
+          </a:effectRef>
+          <a:fontRef idx="minor">
+            <a:schemeClr val="tx1"/>
+          </a:fontRef>
+        </p:style>
+      </p:cxnSp>
+      <p:cxnSp>
+        <p:nvCxnSpPr>
+          <p:cNvPr id="14" name="Straight Arrow Connector 13"/>
+          <p:cNvCxnSpPr/>
+          <p:nvPr/>
+        </p:nvCxnSpPr>
+        <p:spPr>
+          <a:xfrm flipV="1">
+            <a:off x="2766749" y="5625457"/>
+            <a:ext cx="1725241" cy="343984"/>
+          </a:xfrm>
+          <a:prstGeom prst="straightConnector1">
+            <a:avLst/>
+          </a:prstGeom>
+          <a:ln>
+            <a:tailEnd type="triangle"/>
+          </a:ln>
+        </p:spPr>
+        <p:style>
+          <a:lnRef idx="3">
+            <a:schemeClr val="accent1"/>
+          </a:lnRef>
+          <a:fillRef idx="0">
+            <a:schemeClr val="accent1"/>
+          </a:fillRef>
+          <a:effectRef idx="2">
+            <a:schemeClr val="accent1"/>
+          </a:effectRef>
+          <a:fontRef idx="minor">
+            <a:schemeClr val="tx1"/>
+          </a:fontRef>
+        </p:style>
+      </p:cxnSp>
+      <p:cxnSp>
+        <p:nvCxnSpPr>
+          <p:cNvPr id="16" name="Straight Arrow Connector 15"/>
+          <p:cNvCxnSpPr/>
+          <p:nvPr/>
+        </p:nvCxnSpPr>
+        <p:spPr>
+          <a:xfrm flipH="1">
+            <a:off x="6983730" y="2862897"/>
+            <a:ext cx="2441521" cy="188913"/>
+          </a:xfrm>
+          <a:prstGeom prst="straightConnector1">
+            <a:avLst/>
+          </a:prstGeom>
+          <a:ln>
+            <a:tailEnd type="triangle"/>
+          </a:ln>
+        </p:spPr>
+        <p:style>
+          <a:lnRef idx="3">
+            <a:schemeClr val="accent1"/>
+          </a:lnRef>
+          <a:fillRef idx="0">
+            <a:schemeClr val="accent1"/>
+          </a:fillRef>
+          <a:effectRef idx="2">
+            <a:schemeClr val="accent1"/>
+          </a:effectRef>
+          <a:fontRef idx="minor">
+            <a:schemeClr val="tx1"/>
+          </a:fontRef>
+        </p:style>
+      </p:cxnSp>
+      <p:cxnSp>
+        <p:nvCxnSpPr>
+          <p:cNvPr id="18" name="Straight Arrow Connector 17"/>
+          <p:cNvCxnSpPr/>
+          <p:nvPr/>
+        </p:nvCxnSpPr>
+        <p:spPr>
+          <a:xfrm flipH="1">
+            <a:off x="7273291" y="4908867"/>
+            <a:ext cx="2247899" cy="323166"/>
+          </a:xfrm>
+          <a:prstGeom prst="straightConnector1">
+            <a:avLst/>
+          </a:prstGeom>
+          <a:ln>
+            <a:tailEnd type="triangle"/>
+          </a:ln>
+        </p:spPr>
+        <p:style>
+          <a:lnRef idx="3">
+            <a:schemeClr val="accent1"/>
+          </a:lnRef>
+          <a:fillRef idx="0">
+            <a:schemeClr val="accent1"/>
+          </a:fillRef>
+          <a:effectRef idx="2">
+            <a:schemeClr val="accent1"/>
+          </a:effectRef>
+          <a:fontRef idx="minor">
+            <a:schemeClr val="tx1"/>
+          </a:fontRef>
+        </p:style>
+      </p:cxnSp>
+      <p:sp>
+        <p:nvSpPr>
+          <p:cNvPr id="10" name="TextBox 9"/>
+          <p:cNvSpPr txBox="1"/>
+          <p:nvPr/>
+        </p:nvSpPr>
+        <p:spPr>
+          <a:xfrm>
+            <a:off x="9233296" y="2539732"/>
+            <a:ext cx="2021259" cy="646331"/>
+          </a:xfrm>
+          <a:prstGeom prst="rect">
+            <a:avLst/>
+          </a:prstGeom>
+          <a:solidFill>
+            <a:schemeClr val="accent1"/>
+          </a:solidFill>
+        </p:spPr>
+        <p:txBody>
+          <a:bodyPr wrap="square" rtlCol="0">
+            <a:spAutoFit/>
+          </a:bodyPr>
+          <a:lstStyle/>
+          <a:p>
+            <a:r>
+              <a:rPr lang="en-US" b="1" dirty="0" smtClean="0">
+                <a:solidFill>
+                  <a:schemeClr val="bg2">
+                    <a:lumMod val="50000"/>
+                  </a:schemeClr>
+                </a:solidFill>
+              </a:rPr>
+              <a:t>Subclass thread</a:t>
+            </a:r>
+          </a:p>
+          <a:p>
+            <a:r>
+              <a:rPr lang="en-US" b="1" dirty="0" smtClean="0">
+                <a:solidFill>
+                  <a:schemeClr val="bg2">
+                    <a:lumMod val="50000"/>
+                  </a:schemeClr>
+                </a:solidFill>
+              </a:rPr>
+              <a:t>starts</a:t>
+            </a:r>
+            <a:endParaRPr lang="en-US" b="1" dirty="0">
+              <a:solidFill>
+                <a:schemeClr val="bg2">
+                  <a:lumMod val="50000"/>
+                </a:schemeClr>
+              </a:solidFill>
+            </a:endParaRPr>
+          </a:p>
+        </p:txBody>
+      </p:sp>
+      <p:sp>
+        <p:nvSpPr>
+          <p:cNvPr id="11" name="TextBox 10"/>
+          <p:cNvSpPr txBox="1"/>
+          <p:nvPr/>
+        </p:nvSpPr>
+        <p:spPr>
+          <a:xfrm>
+            <a:off x="9233295" y="4585702"/>
+            <a:ext cx="2021259" cy="646331"/>
+          </a:xfrm>
+          <a:prstGeom prst="rect">
+            <a:avLst/>
+          </a:prstGeom>
+          <a:solidFill>
+            <a:schemeClr val="accent1"/>
+          </a:solidFill>
+        </p:spPr>
+        <p:txBody>
+          <a:bodyPr wrap="square" rtlCol="0">
+            <a:spAutoFit/>
+          </a:bodyPr>
+          <a:lstStyle/>
+          <a:p>
+            <a:r>
+              <a:rPr lang="en-US" b="1" dirty="0" smtClean="0">
+                <a:solidFill>
+                  <a:schemeClr val="bg2">
+                    <a:lumMod val="50000"/>
+                  </a:schemeClr>
+                </a:solidFill>
+              </a:rPr>
+              <a:t>Subclass thread finishes</a:t>
+            </a:r>
+            <a:endParaRPr lang="en-US" b="1" dirty="0">
+              <a:solidFill>
+                <a:schemeClr val="bg2">
+                  <a:lumMod val="50000"/>
+                </a:schemeClr>
+              </a:solidFill>
+            </a:endParaRPr>
+          </a:p>
+        </p:txBody>
+      </p:sp>
+      <p:sp>
+        <p:nvSpPr>
+          <p:cNvPr id="9" name="TextBox 8"/>
+          <p:cNvSpPr txBox="1"/>
+          <p:nvPr/>
+        </p:nvSpPr>
+        <p:spPr>
+          <a:xfrm>
+            <a:off x="1137046" y="1530082"/>
+            <a:ext cx="2021259" cy="646331"/>
+          </a:xfrm>
+          <a:prstGeom prst="rect">
+            <a:avLst/>
+          </a:prstGeom>
+          <a:solidFill>
+            <a:schemeClr val="accent1"/>
+          </a:solidFill>
+        </p:spPr>
+        <p:txBody>
+          <a:bodyPr wrap="square" rtlCol="0">
+            <a:spAutoFit/>
+          </a:bodyPr>
+          <a:lstStyle/>
+          <a:p>
+            <a:r>
+              <a:rPr lang="en-US" b="1" dirty="0" smtClean="0">
+                <a:solidFill>
+                  <a:schemeClr val="bg2">
+                    <a:lumMod val="50000"/>
+                  </a:schemeClr>
+                </a:solidFill>
+              </a:rPr>
+              <a:t>Main thread</a:t>
+            </a:r>
+          </a:p>
+          <a:p>
+            <a:r>
+              <a:rPr lang="en-US" b="1" dirty="0" smtClean="0">
+                <a:solidFill>
+                  <a:schemeClr val="bg2">
+                    <a:lumMod val="50000"/>
+                  </a:schemeClr>
+                </a:solidFill>
+              </a:rPr>
+              <a:t>starts</a:t>
+            </a:r>
+            <a:endParaRPr lang="en-US" b="1" dirty="0">
+              <a:solidFill>
+                <a:schemeClr val="bg2">
+                  <a:lumMod val="50000"/>
+                </a:schemeClr>
+              </a:solidFill>
+            </a:endParaRPr>
+          </a:p>
+        </p:txBody>
+      </p:sp>
+      <p:sp>
+        <p:nvSpPr>
+          <p:cNvPr id="12" name="TextBox 11"/>
+          <p:cNvSpPr txBox="1"/>
+          <p:nvPr/>
+        </p:nvSpPr>
+        <p:spPr>
+          <a:xfrm>
+            <a:off x="1137045" y="5710180"/>
+            <a:ext cx="2021259" cy="646331"/>
+          </a:xfrm>
+          <a:prstGeom prst="rect">
+            <a:avLst/>
+          </a:prstGeom>
+          <a:solidFill>
+            <a:schemeClr val="accent1"/>
+          </a:solidFill>
+        </p:spPr>
+        <p:txBody>
+          <a:bodyPr wrap="square" rtlCol="0">
+            <a:spAutoFit/>
+          </a:bodyPr>
+          <a:lstStyle/>
+          <a:p>
+            <a:r>
+              <a:rPr lang="en-US" b="1" dirty="0" smtClean="0">
+                <a:solidFill>
+                  <a:schemeClr val="bg2">
+                    <a:lumMod val="50000"/>
+                  </a:schemeClr>
+                </a:solidFill>
+              </a:rPr>
+              <a:t>Main thread</a:t>
+            </a:r>
+          </a:p>
+          <a:p>
+            <a:r>
+              <a:rPr lang="en-US" b="1" dirty="0" smtClean="0">
+                <a:solidFill>
+                  <a:schemeClr val="bg2">
+                    <a:lumMod val="50000"/>
+                  </a:schemeClr>
+                </a:solidFill>
+              </a:rPr>
+              <a:t>finishes</a:t>
+            </a:r>
+            <a:endParaRPr lang="en-US" b="1" dirty="0">
+              <a:solidFill>
+                <a:schemeClr val="bg2">
+                  <a:lumMod val="50000"/>
+                </a:schemeClr>
+              </a:solidFill>
+            </a:endParaRPr>
+          </a:p>
+        </p:txBody>
+      </p:sp>
+      <p:cxnSp>
+        <p:nvCxnSpPr>
+          <p:cNvPr id="21" name="Straight Arrow Connector 20"/>
+          <p:cNvCxnSpPr/>
+          <p:nvPr/>
+        </p:nvCxnSpPr>
+        <p:spPr>
+          <a:xfrm flipV="1">
+            <a:off x="2406341" y="3686581"/>
+            <a:ext cx="2085649" cy="105542"/>
+          </a:xfrm>
+          <a:prstGeom prst="straightConnector1">
+            <a:avLst/>
+          </a:prstGeom>
+          <a:ln>
+            <a:tailEnd type="triangle"/>
+          </a:ln>
+        </p:spPr>
+        <p:style>
+          <a:lnRef idx="3">
+            <a:schemeClr val="accent1"/>
+          </a:lnRef>
+          <a:fillRef idx="0">
+            <a:schemeClr val="accent1"/>
+          </a:fillRef>
+          <a:effectRef idx="2">
+            <a:schemeClr val="accent1"/>
+          </a:effectRef>
+          <a:fontRef idx="minor">
+            <a:schemeClr val="tx1"/>
+          </a:fontRef>
+        </p:style>
+      </p:cxnSp>
+      <p:sp>
+        <p:nvSpPr>
+          <p:cNvPr id="20" name="TextBox 19"/>
+          <p:cNvSpPr txBox="1"/>
+          <p:nvPr/>
+        </p:nvSpPr>
+        <p:spPr>
+          <a:xfrm>
+            <a:off x="745490" y="3304519"/>
+            <a:ext cx="2021259" cy="923330"/>
+          </a:xfrm>
+          <a:prstGeom prst="rect">
+            <a:avLst/>
+          </a:prstGeom>
+          <a:solidFill>
+            <a:schemeClr val="accent1"/>
+          </a:solidFill>
+        </p:spPr>
+        <p:txBody>
+          <a:bodyPr wrap="square" rtlCol="0">
+            <a:spAutoFit/>
+          </a:bodyPr>
+          <a:lstStyle/>
+          <a:p>
+            <a:r>
+              <a:rPr lang="en-US" b="1" dirty="0" smtClean="0">
+                <a:solidFill>
+                  <a:schemeClr val="bg2">
+                    <a:lumMod val="50000"/>
+                  </a:schemeClr>
+                </a:solidFill>
+              </a:rPr>
+              <a:t>Main thread waits on subclass thread</a:t>
+            </a:r>
           </a:p>
         </p:txBody>
       </p:sp>
@@ -6968,11 +7607,7 @@
             </a:r>
             <a:r>
               <a:rPr lang="en-US" dirty="0" smtClean="0"/>
-              <a:t> on a </a:t>
-            </a:r>
-            <a:r>
-              <a:rPr lang="en-US" dirty="0" err="1" smtClean="0"/>
-              <a:t>QThread</a:t>
+              <a:t> on a QThread</a:t>
             </a:r>
             <a:endParaRPr lang="en-US" dirty="0"/>
           </a:p>
@@ -6998,35 +7633,43 @@
               <a:t>Create classes that inherit from </a:t>
             </a:r>
             <a:r>
-              <a:rPr lang="en-US" dirty="0" err="1" smtClean="0"/>
-              <a:t>QOjbect</a:t>
-            </a:r>
-            <a:r>
               <a:rPr lang="en-US" dirty="0" smtClean="0"/>
-              <a:t> to act as worker object’s on your </a:t>
-            </a:r>
-            <a:r>
-              <a:rPr lang="en-US" dirty="0" err="1" smtClean="0"/>
-              <a:t>QThread</a:t>
+              <a:t>QObject </a:t>
+            </a:r>
+            <a:r>
+              <a:rPr lang="en-US" dirty="0" smtClean="0"/>
+              <a:t>to act as worker object’s on your QThread</a:t>
             </a:r>
             <a:endParaRPr lang="en-US" dirty="0"/>
           </a:p>
           <a:p>
             <a:r>
               <a:rPr lang="en-US" dirty="0" smtClean="0"/>
-              <a:t>Move thread to your </a:t>
-            </a:r>
-            <a:r>
-              <a:rPr lang="en-US" dirty="0" err="1" smtClean="0"/>
-              <a:t>Qthread</a:t>
+              <a:t>Move </a:t>
             </a:r>
             <a:r>
               <a:rPr lang="en-US" dirty="0" smtClean="0"/>
-              <a:t> with the </a:t>
-            </a:r>
-            <a:r>
-              <a:rPr lang="en-US" dirty="0" err="1" smtClean="0"/>
-              <a:t>QOjbect</a:t>
+              <a:t>QO</a:t>
+            </a:r>
+            <a:r>
+              <a:rPr lang="en-US" dirty="0" smtClean="0"/>
+              <a:t>bject </a:t>
+            </a:r>
+            <a:r>
+              <a:rPr lang="en-US" dirty="0" smtClean="0"/>
+              <a:t>to your </a:t>
+            </a:r>
+            <a:r>
+              <a:rPr lang="en-US" dirty="0" smtClean="0"/>
+              <a:t>QThread </a:t>
+            </a:r>
+            <a:r>
+              <a:rPr lang="en-US" dirty="0" smtClean="0"/>
+              <a:t>with the </a:t>
+            </a:r>
+            <a:r>
+              <a:rPr lang="en-US" dirty="0" smtClean="0"/>
+              <a:t>QObject</a:t>
             </a:r>
             <a:r>
               <a:rPr lang="en-US" dirty="0" smtClean="0"/>
@@ -7044,15 +7687,33 @@
           <a:p>
             <a:r>
               <a:rPr lang="en-US" dirty="0" smtClean="0"/>
-              <a:t>Interact with you new worker objects on different threads using </a:t>
+              <a:t>Interact with you new worker objects on different threads </a:t>
+            </a:r>
+            <a:r>
+              <a:rPr lang="en-US" dirty="0" smtClean="0"/>
+              <a:t>using </a:t>
+            </a:r>
+            <a:r>
+              <a:rPr lang="en-US" dirty="0" smtClean="0"/>
+              <a:t>Signals and </a:t>
+            </a:r>
+            <a:r>
+              <a:rPr lang="en-US" dirty="0" smtClean="0"/>
+              <a:t>Slots</a:t>
+            </a:r>
+          </a:p>
+          <a:p>
+            <a:r>
+              <a:rPr lang="en-US" dirty="0" smtClean="0"/>
+              <a:t>The </a:t>
             </a:r>
             <a:r>
               <a:rPr lang="en-US" dirty="0" err="1" smtClean="0"/>
-              <a:t>Qt’s</a:t>
+              <a:t>QThread’s</a:t>
             </a:r>
             <a:r>
               <a:rPr lang="en-US" dirty="0" smtClean="0"/>
-              <a:t> Signals and Slots</a:t>
+              <a:t> event loop handles incoming signals</a:t>
             </a:r>
             <a:endParaRPr lang="en-US" dirty="0"/>
           </a:p>
@@ -7143,11 +7804,7 @@
             </a:r>
             <a:r>
               <a:rPr lang="en-US" dirty="0"/>
-              <a:t> on a </a:t>
-            </a:r>
-            <a:r>
-              <a:rPr lang="en-US" dirty="0" err="1"/>
-              <a:t>QThread</a:t>
+              <a:t> on a QThread</a:t>
             </a:r>
             <a:r>
               <a:rPr lang="en-US" dirty="0" smtClean="0"/>
@@ -7235,6 +7892,257 @@
           </a:prstGeom>
         </p:spPr>
       </p:pic>
+      <p:sp>
+        <p:nvSpPr>
+          <p:cNvPr id="6" name="TextBox 5"/>
+          <p:cNvSpPr txBox="1"/>
+          <p:nvPr/>
+        </p:nvSpPr>
+        <p:spPr>
+          <a:xfrm>
+            <a:off x="3541457" y="2178310"/>
+            <a:ext cx="2021259" cy="646331"/>
+          </a:xfrm>
+          <a:prstGeom prst="rect">
+            <a:avLst/>
+          </a:prstGeom>
+          <a:solidFill>
+            <a:schemeClr val="accent1"/>
+          </a:solidFill>
+        </p:spPr>
+        <p:txBody>
+          <a:bodyPr wrap="square" rtlCol="0">
+            <a:spAutoFit/>
+          </a:bodyPr>
+          <a:lstStyle/>
+          <a:p>
+            <a:r>
+              <a:rPr lang="en-US" b="1" dirty="0" smtClean="0">
+                <a:solidFill>
+                  <a:schemeClr val="bg2">
+                    <a:lumMod val="50000"/>
+                  </a:schemeClr>
+                </a:solidFill>
+              </a:rPr>
+              <a:t>Worker QObject Subclass</a:t>
+            </a:r>
+            <a:endParaRPr lang="en-US" b="1" dirty="0">
+              <a:solidFill>
+                <a:schemeClr val="bg2">
+                  <a:lumMod val="50000"/>
+                </a:schemeClr>
+              </a:solidFill>
+            </a:endParaRPr>
+          </a:p>
+        </p:txBody>
+      </p:sp>
+      <p:cxnSp>
+        <p:nvCxnSpPr>
+          <p:cNvPr id="10" name="Straight Arrow Connector 9"/>
+          <p:cNvCxnSpPr/>
+          <p:nvPr/>
+        </p:nvCxnSpPr>
+        <p:spPr>
+          <a:xfrm flipH="1">
+            <a:off x="9178290" y="3235892"/>
+            <a:ext cx="1138502" cy="625181"/>
+          </a:xfrm>
+          <a:prstGeom prst="straightConnector1">
+            <a:avLst/>
+          </a:prstGeom>
+          <a:ln>
+            <a:tailEnd type="triangle"/>
+          </a:ln>
+        </p:spPr>
+        <p:style>
+          <a:lnRef idx="3">
+            <a:schemeClr val="accent1"/>
+          </a:lnRef>
+          <a:fillRef idx="0">
+            <a:schemeClr val="accent1"/>
+          </a:fillRef>
+          <a:effectRef idx="2">
+            <a:schemeClr val="accent1"/>
+          </a:effectRef>
+          <a:fontRef idx="minor">
+            <a:schemeClr val="tx1"/>
+          </a:fontRef>
+        </p:style>
+      </p:cxnSp>
+      <p:sp>
+        <p:nvSpPr>
+          <p:cNvPr id="9" name="TextBox 8"/>
+          <p:cNvSpPr txBox="1"/>
+          <p:nvPr/>
+        </p:nvSpPr>
+        <p:spPr>
+          <a:xfrm>
+            <a:off x="9879043" y="2501475"/>
+            <a:ext cx="2021259" cy="923330"/>
+          </a:xfrm>
+          <a:prstGeom prst="rect">
+            <a:avLst/>
+          </a:prstGeom>
+          <a:solidFill>
+            <a:schemeClr val="accent1"/>
+          </a:solidFill>
+        </p:spPr>
+        <p:txBody>
+          <a:bodyPr wrap="square" rtlCol="0">
+            <a:spAutoFit/>
+          </a:bodyPr>
+          <a:lstStyle/>
+          <a:p>
+            <a:r>
+              <a:rPr lang="en-US" b="1" dirty="0" smtClean="0">
+                <a:solidFill>
+                  <a:schemeClr val="bg2">
+                    <a:lumMod val="50000"/>
+                  </a:schemeClr>
+                </a:solidFill>
+              </a:rPr>
+              <a:t>Move worker QObject onto new QThread</a:t>
+            </a:r>
+            <a:endParaRPr lang="en-US" b="1" dirty="0">
+              <a:solidFill>
+                <a:schemeClr val="bg2">
+                  <a:lumMod val="50000"/>
+                </a:schemeClr>
+              </a:solidFill>
+            </a:endParaRPr>
+          </a:p>
+        </p:txBody>
+      </p:sp>
+      <p:cxnSp>
+        <p:nvCxnSpPr>
+          <p:cNvPr id="12" name="Straight Arrow Connector 11"/>
+          <p:cNvCxnSpPr/>
+          <p:nvPr/>
+        </p:nvCxnSpPr>
+        <p:spPr>
+          <a:xfrm flipH="1" flipV="1">
+            <a:off x="8458200" y="4512301"/>
+            <a:ext cx="1592634" cy="232263"/>
+          </a:xfrm>
+          <a:prstGeom prst="straightConnector1">
+            <a:avLst/>
+          </a:prstGeom>
+          <a:ln>
+            <a:tailEnd type="triangle"/>
+          </a:ln>
+        </p:spPr>
+        <p:style>
+          <a:lnRef idx="3">
+            <a:schemeClr val="accent1"/>
+          </a:lnRef>
+          <a:fillRef idx="0">
+            <a:schemeClr val="accent1"/>
+          </a:fillRef>
+          <a:effectRef idx="2">
+            <a:schemeClr val="accent1"/>
+          </a:effectRef>
+          <a:fontRef idx="minor">
+            <a:schemeClr val="tx1"/>
+          </a:fontRef>
+        </p:style>
+      </p:cxnSp>
+      <p:cxnSp>
+        <p:nvCxnSpPr>
+          <p:cNvPr id="14" name="Straight Arrow Connector 13"/>
+          <p:cNvCxnSpPr/>
+          <p:nvPr/>
+        </p:nvCxnSpPr>
+        <p:spPr>
+          <a:xfrm flipH="1">
+            <a:off x="8458200" y="5247824"/>
+            <a:ext cx="1592634" cy="147968"/>
+          </a:xfrm>
+          <a:prstGeom prst="straightConnector1">
+            <a:avLst/>
+          </a:prstGeom>
+          <a:ln>
+            <a:tailEnd type="triangle"/>
+          </a:ln>
+        </p:spPr>
+        <p:style>
+          <a:lnRef idx="3">
+            <a:schemeClr val="accent1"/>
+          </a:lnRef>
+          <a:fillRef idx="0">
+            <a:schemeClr val="accent1"/>
+          </a:fillRef>
+          <a:effectRef idx="2">
+            <a:schemeClr val="accent1"/>
+          </a:effectRef>
+          <a:fontRef idx="minor">
+            <a:schemeClr val="tx1"/>
+          </a:fontRef>
+        </p:style>
+      </p:cxnSp>
+      <p:sp>
+        <p:nvSpPr>
+          <p:cNvPr id="11" name="TextBox 10"/>
+          <p:cNvSpPr txBox="1"/>
+          <p:nvPr/>
+        </p:nvSpPr>
+        <p:spPr>
+          <a:xfrm>
+            <a:off x="9879042" y="4595490"/>
+            <a:ext cx="2021259" cy="923330"/>
+          </a:xfrm>
+          <a:prstGeom prst="rect">
+            <a:avLst/>
+          </a:prstGeom>
+          <a:solidFill>
+            <a:schemeClr val="accent1"/>
+          </a:solidFill>
+        </p:spPr>
+        <p:txBody>
+          <a:bodyPr wrap="square" rtlCol="0">
+            <a:spAutoFit/>
+          </a:bodyPr>
+          <a:lstStyle/>
+          <a:p>
+            <a:r>
+              <a:rPr lang="en-US" b="1" dirty="0" smtClean="0">
+                <a:solidFill>
+                  <a:schemeClr val="bg2">
+                    <a:lumMod val="50000"/>
+                  </a:schemeClr>
+                </a:solidFill>
+              </a:rPr>
+              <a:t>Start and quit </a:t>
+            </a:r>
+            <a:r>
+              <a:rPr lang="en-US" b="1" dirty="0" err="1" smtClean="0">
+                <a:solidFill>
+                  <a:schemeClr val="bg2">
+                    <a:lumMod val="50000"/>
+                  </a:schemeClr>
+                </a:solidFill>
+              </a:rPr>
+              <a:t>QThread’s</a:t>
+            </a:r>
+            <a:r>
+              <a:rPr lang="en-US" b="1" dirty="0" smtClean="0">
+                <a:solidFill>
+                  <a:schemeClr val="bg2">
+                    <a:lumMod val="50000"/>
+                  </a:schemeClr>
+                </a:solidFill>
+              </a:rPr>
+              <a:t> event loop</a:t>
+            </a:r>
+            <a:endParaRPr lang="en-US" b="1" dirty="0">
+              <a:solidFill>
+                <a:schemeClr val="bg2">
+                  <a:lumMod val="50000"/>
+                </a:schemeClr>
+              </a:solidFill>
+            </a:endParaRPr>
+          </a:p>
+        </p:txBody>
+      </p:sp>
     </p:spTree>
     <p:extLst>
       <p:ext uri="{BB962C8B-B14F-4D97-AF65-F5344CB8AC3E}">
@@ -7297,15 +8205,7 @@
             </a:r>
             <a:r>
               <a:rPr lang="en-US" dirty="0"/>
-              <a:t> on a </a:t>
-            </a:r>
-            <a:r>
-              <a:rPr lang="en-US" dirty="0" err="1"/>
-              <a:t>QThread</a:t>
-            </a:r>
-            <a:r>
-              <a:rPr lang="en-US" dirty="0"/>
-              <a:t> </a:t>
+              <a:t> on a QThread </a:t>
             </a:r>
             <a:r>
               <a:rPr lang="en-US" dirty="0" smtClean="0"/>
@@ -7360,6 +8260,60 @@
           <a:lstStyle/>
           <a:p>
             <a:endParaRPr lang="en-US"/>
+          </a:p>
+        </p:txBody>
+      </p:sp>
+      <p:sp>
+        <p:nvSpPr>
+          <p:cNvPr id="6" name="TextBox 5"/>
+          <p:cNvSpPr txBox="1"/>
+          <p:nvPr/>
+        </p:nvSpPr>
+        <p:spPr>
+          <a:xfrm>
+            <a:off x="646111" y="3121456"/>
+            <a:ext cx="2516271" cy="1200329"/>
+          </a:xfrm>
+          <a:prstGeom prst="rect">
+            <a:avLst/>
+          </a:prstGeom>
+          <a:solidFill>
+            <a:schemeClr val="accent1"/>
+          </a:solidFill>
+        </p:spPr>
+        <p:txBody>
+          <a:bodyPr wrap="square" rtlCol="0">
+            <a:spAutoFit/>
+          </a:bodyPr>
+          <a:lstStyle/>
+          <a:p>
+            <a:r>
+              <a:rPr lang="en-US" b="1" dirty="0" err="1" smtClean="0">
+                <a:solidFill>
+                  <a:schemeClr val="bg2">
+                    <a:lumMod val="50000"/>
+                  </a:schemeClr>
+                </a:solidFill>
+              </a:rPr>
+              <a:t>QObjectSubclass</a:t>
+            </a:r>
+            <a:r>
+              <a:rPr lang="en-US" b="1" dirty="0" smtClean="0">
+                <a:solidFill>
+                  <a:schemeClr val="bg2">
+                    <a:lumMod val="50000"/>
+                  </a:schemeClr>
+                </a:solidFill>
+              </a:rPr>
+              <a:t> never runs because no signal initiates its slot function</a:t>
+            </a:r>
+            <a:endParaRPr lang="en-US" b="1" dirty="0">
+              <a:solidFill>
+                <a:schemeClr val="bg2">
+                  <a:lumMod val="50000"/>
+                </a:schemeClr>
+              </a:solidFill>
+            </a:endParaRPr>
           </a:p>
         </p:txBody>
       </p:sp>
@@ -7444,8 +8398,13 @@
             </a:r>
             <a:r>
               <a:rPr lang="en-US" dirty="0" smtClean="0"/>
-              <a:t> Signals and Slots are used to facilitate communication between objects</a:t>
-            </a:r>
+              <a:t> Signals and Slots are used to facilitate communication between </a:t>
+            </a:r>
+            <a:r>
+              <a:rPr lang="en-US" dirty="0" err="1" smtClean="0"/>
+              <a:t>QObjects</a:t>
+            </a:r>
+            <a:endParaRPr lang="en-US" dirty="0" smtClean="0"/>
           </a:p>
           <a:p>
             <a:r>
@@ -7466,8 +8425,25 @@
           <a:p>
             <a:r>
               <a:rPr lang="en-US" dirty="0" smtClean="0"/>
-              <a:t>It is a simple solution to manage communication between different threads of execution</a:t>
-            </a:r>
+              <a:t>Easy solution </a:t>
+            </a:r>
+            <a:r>
+              <a:rPr lang="en-US" dirty="0" smtClean="0"/>
+              <a:t>to manage communication between </a:t>
+            </a:r>
+            <a:r>
+              <a:rPr lang="en-US" dirty="0" err="1" smtClean="0"/>
+              <a:t>QO</a:t>
+            </a:r>
+            <a:r>
+              <a:rPr lang="en-US" dirty="0" err="1" smtClean="0"/>
+              <a:t>bjects</a:t>
+            </a:r>
+            <a:r>
+              <a:rPr lang="en-US" dirty="0" smtClean="0"/>
+              <a:t> on different threads</a:t>
+            </a:r>
+            <a:endParaRPr lang="en-US" dirty="0" smtClean="0"/>
           </a:p>
         </p:txBody>
       </p:sp>
@@ -7567,21 +8543,42 @@
           <a:p>
             <a:r>
               <a:rPr lang="en-US" dirty="0" smtClean="0"/>
-              <a:t>When a signal is emitted, execution of the slot happens directly after it is called.</a:t>
-            </a:r>
-          </a:p>
-          <a:p>
+              <a:t>Slot execution</a:t>
+            </a:r>
             <a:r>
               <a:rPr lang="en-US" dirty="0" smtClean="0"/>
-              <a:t>Does not change the current execution thread</a:t>
-            </a:r>
-          </a:p>
-          <a:p>
+              <a:t> </a:t>
+            </a:r>
             <a:r>
               <a:rPr lang="en-US" dirty="0" smtClean="0"/>
-              <a:t>Behaves like a normal function call</a:t>
-            </a:r>
-            <a:endParaRPr lang="en-US" dirty="0"/>
+              <a:t>happens directly after </a:t>
+            </a:r>
+            <a:r>
+              <a:rPr lang="en-US" dirty="0" smtClean="0"/>
+              <a:t>a connected signal is emitted</a:t>
+            </a:r>
+          </a:p>
+          <a:p>
+            <a:r>
+              <a:rPr lang="en-US" dirty="0"/>
+              <a:t>Behaves like a normal function </a:t>
+            </a:r>
+            <a:r>
+              <a:rPr lang="en-US" dirty="0" smtClean="0"/>
+              <a:t>call</a:t>
+            </a:r>
+            <a:endParaRPr lang="en-US" dirty="0" smtClean="0"/>
+          </a:p>
+          <a:p>
+            <a:r>
+              <a:rPr lang="en-US" dirty="0" smtClean="0"/>
+              <a:t>Slot execution happens on the signal’s </a:t>
+            </a:r>
+            <a:r>
+              <a:rPr lang="en-US" dirty="0" smtClean="0"/>
+              <a:t>thread of control</a:t>
+            </a:r>
+            <a:endParaRPr lang="en-US" dirty="0" smtClean="0"/>
           </a:p>
         </p:txBody>
       </p:sp>
@@ -7742,6 +8739,170 @@
           </a:prstGeom>
         </p:spPr>
       </p:pic>
+      <p:cxnSp>
+        <p:nvCxnSpPr>
+          <p:cNvPr id="8" name="Straight Arrow Connector 7"/>
+          <p:cNvCxnSpPr/>
+          <p:nvPr/>
+        </p:nvCxnSpPr>
+        <p:spPr>
+          <a:xfrm flipV="1">
+            <a:off x="6782376" y="1988820"/>
+            <a:ext cx="1456036" cy="408032"/>
+          </a:xfrm>
+          <a:prstGeom prst="straightConnector1">
+            <a:avLst/>
+          </a:prstGeom>
+          <a:ln>
+            <a:tailEnd type="triangle"/>
+          </a:ln>
+        </p:spPr>
+        <p:style>
+          <a:lnRef idx="3">
+            <a:schemeClr val="accent1"/>
+          </a:lnRef>
+          <a:fillRef idx="0">
+            <a:schemeClr val="accent1"/>
+          </a:fillRef>
+          <a:effectRef idx="2">
+            <a:schemeClr val="accent1"/>
+          </a:effectRef>
+          <a:fontRef idx="minor">
+            <a:schemeClr val="tx1"/>
+          </a:fontRef>
+        </p:style>
+      </p:cxnSp>
+      <p:sp>
+        <p:nvSpPr>
+          <p:cNvPr id="7" name="TextBox 6"/>
+          <p:cNvSpPr txBox="1"/>
+          <p:nvPr/>
+        </p:nvSpPr>
+        <p:spPr>
+          <a:xfrm>
+            <a:off x="4385739" y="2073687"/>
+            <a:ext cx="2516271" cy="646331"/>
+          </a:xfrm>
+          <a:prstGeom prst="rect">
+            <a:avLst/>
+          </a:prstGeom>
+          <a:solidFill>
+            <a:schemeClr val="accent1"/>
+          </a:solidFill>
+        </p:spPr>
+        <p:txBody>
+          <a:bodyPr wrap="square" rtlCol="0">
+            <a:spAutoFit/>
+          </a:bodyPr>
+          <a:lstStyle/>
+          <a:p>
+            <a:r>
+              <a:rPr lang="en-US" b="1" dirty="0" err="1" smtClean="0">
+                <a:solidFill>
+                  <a:schemeClr val="bg2">
+                    <a:lumMod val="50000"/>
+                  </a:schemeClr>
+                </a:solidFill>
+              </a:rPr>
+              <a:t>QObjectSubclass</a:t>
+            </a:r>
+            <a:r>
+              <a:rPr lang="en-US" b="1" dirty="0" smtClean="0">
+                <a:solidFill>
+                  <a:schemeClr val="bg2">
+                    <a:lumMod val="50000"/>
+                  </a:schemeClr>
+                </a:solidFill>
+              </a:rPr>
+              <a:t> has a simple slot</a:t>
+            </a:r>
+            <a:endParaRPr lang="en-US" b="1" dirty="0">
+              <a:solidFill>
+                <a:schemeClr val="bg2">
+                  <a:lumMod val="50000"/>
+                </a:schemeClr>
+              </a:solidFill>
+            </a:endParaRPr>
+          </a:p>
+        </p:txBody>
+      </p:sp>
+      <p:cxnSp>
+        <p:nvCxnSpPr>
+          <p:cNvPr id="10" name="Straight Arrow Connector 9"/>
+          <p:cNvCxnSpPr/>
+          <p:nvPr/>
+        </p:nvCxnSpPr>
+        <p:spPr>
+          <a:xfrm flipH="1">
+            <a:off x="4046220" y="4856039"/>
+            <a:ext cx="1280120" cy="184591"/>
+          </a:xfrm>
+          <a:prstGeom prst="straightConnector1">
+            <a:avLst/>
+          </a:prstGeom>
+          <a:ln>
+            <a:tailEnd type="triangle"/>
+          </a:ln>
+        </p:spPr>
+        <p:style>
+          <a:lnRef idx="3">
+            <a:schemeClr val="accent1"/>
+          </a:lnRef>
+          <a:fillRef idx="0">
+            <a:schemeClr val="accent1"/>
+          </a:fillRef>
+          <a:effectRef idx="2">
+            <a:schemeClr val="accent1"/>
+          </a:effectRef>
+          <a:fontRef idx="minor">
+            <a:schemeClr val="tx1"/>
+          </a:fontRef>
+        </p:style>
+      </p:cxnSp>
+      <p:sp>
+        <p:nvSpPr>
+          <p:cNvPr id="9" name="TextBox 8"/>
+          <p:cNvSpPr txBox="1"/>
+          <p:nvPr/>
+        </p:nvSpPr>
+        <p:spPr>
+          <a:xfrm>
+            <a:off x="5194585" y="4614957"/>
+            <a:ext cx="2516271" cy="646331"/>
+          </a:xfrm>
+          <a:prstGeom prst="rect">
+            <a:avLst/>
+          </a:prstGeom>
+          <a:solidFill>
+            <a:schemeClr val="accent1"/>
+          </a:solidFill>
+        </p:spPr>
+        <p:txBody>
+          <a:bodyPr wrap="square" rtlCol="0">
+            <a:spAutoFit/>
+          </a:bodyPr>
+          <a:lstStyle/>
+          <a:p>
+            <a:r>
+              <a:rPr lang="en-US" b="1" dirty="0" smtClean="0">
+                <a:solidFill>
+                  <a:schemeClr val="bg2">
+                    <a:lumMod val="50000"/>
+                  </a:schemeClr>
+                </a:solidFill>
+              </a:rPr>
+              <a:t>Normal function emits a simple signal</a:t>
+            </a:r>
+            <a:endParaRPr lang="en-US" b="1" dirty="0">
+              <a:solidFill>
+                <a:schemeClr val="bg2">
+                  <a:lumMod val="50000"/>
+                </a:schemeClr>
+              </a:solidFill>
+            </a:endParaRPr>
+          </a:p>
+        </p:txBody>
+      </p:sp>
     </p:spTree>
     <p:extLst>
       <p:ext uri="{BB962C8B-B14F-4D97-AF65-F5344CB8AC3E}">
@@ -7854,6 +9015,160 @@
           </a:p>
         </p:txBody>
       </p:sp>
+      <p:cxnSp>
+        <p:nvCxnSpPr>
+          <p:cNvPr id="7" name="Straight Arrow Connector 6"/>
+          <p:cNvCxnSpPr/>
+          <p:nvPr/>
+        </p:nvCxnSpPr>
+        <p:spPr>
+          <a:xfrm>
+            <a:off x="3056196" y="3934598"/>
+            <a:ext cx="1630104" cy="660262"/>
+          </a:xfrm>
+          <a:prstGeom prst="straightConnector1">
+            <a:avLst/>
+          </a:prstGeom>
+          <a:ln>
+            <a:tailEnd type="triangle"/>
+          </a:ln>
+        </p:spPr>
+        <p:style>
+          <a:lnRef idx="3">
+            <a:schemeClr val="accent1"/>
+          </a:lnRef>
+          <a:fillRef idx="0">
+            <a:schemeClr val="accent1"/>
+          </a:fillRef>
+          <a:effectRef idx="2">
+            <a:schemeClr val="accent1"/>
+          </a:effectRef>
+          <a:fontRef idx="minor">
+            <a:schemeClr val="tx1"/>
+          </a:fontRef>
+        </p:style>
+      </p:cxnSp>
+      <p:sp>
+        <p:nvSpPr>
+          <p:cNvPr id="6" name="TextBox 5"/>
+          <p:cNvSpPr txBox="1"/>
+          <p:nvPr/>
+        </p:nvSpPr>
+        <p:spPr>
+          <a:xfrm>
+            <a:off x="646111" y="3472933"/>
+            <a:ext cx="2516271" cy="923330"/>
+          </a:xfrm>
+          <a:prstGeom prst="rect">
+            <a:avLst/>
+          </a:prstGeom>
+          <a:solidFill>
+            <a:schemeClr val="accent1"/>
+          </a:solidFill>
+        </p:spPr>
+        <p:txBody>
+          <a:bodyPr wrap="square" rtlCol="0">
+            <a:spAutoFit/>
+          </a:bodyPr>
+          <a:lstStyle/>
+          <a:p>
+            <a:r>
+              <a:rPr lang="en-US" b="1" dirty="0" smtClean="0">
+                <a:solidFill>
+                  <a:schemeClr val="bg2">
+                    <a:lumMod val="50000"/>
+                  </a:schemeClr>
+                </a:solidFill>
+              </a:rPr>
+              <a:t>Connects QObject 1’s signal to QObject 2’s slot</a:t>
+            </a:r>
+            <a:endParaRPr lang="en-US" b="1" dirty="0">
+              <a:solidFill>
+                <a:schemeClr val="bg2">
+                  <a:lumMod val="50000"/>
+                </a:schemeClr>
+              </a:solidFill>
+            </a:endParaRPr>
+          </a:p>
+        </p:txBody>
+      </p:sp>
+      <p:cxnSp>
+        <p:nvCxnSpPr>
+          <p:cNvPr id="9" name="Straight Arrow Connector 8"/>
+          <p:cNvCxnSpPr/>
+          <p:nvPr/>
+        </p:nvCxnSpPr>
+        <p:spPr>
+          <a:xfrm flipH="1" flipV="1">
+            <a:off x="6541477" y="5495945"/>
+            <a:ext cx="2786565" cy="89428"/>
+          </a:xfrm>
+          <a:prstGeom prst="straightConnector1">
+            <a:avLst/>
+          </a:prstGeom>
+          <a:ln>
+            <a:tailEnd type="triangle"/>
+          </a:ln>
+        </p:spPr>
+        <p:style>
+          <a:lnRef idx="3">
+            <a:schemeClr val="accent1"/>
+          </a:lnRef>
+          <a:fillRef idx="0">
+            <a:schemeClr val="accent1"/>
+          </a:fillRef>
+          <a:effectRef idx="2">
+            <a:schemeClr val="accent1"/>
+          </a:effectRef>
+          <a:fontRef idx="minor">
+            <a:schemeClr val="tx1"/>
+          </a:fontRef>
+        </p:style>
+      </p:cxnSp>
+      <p:sp>
+        <p:nvSpPr>
+          <p:cNvPr id="8" name="TextBox 7"/>
+          <p:cNvSpPr txBox="1"/>
+          <p:nvPr/>
+        </p:nvSpPr>
+        <p:spPr>
+          <a:xfrm>
+            <a:off x="9135804" y="5078994"/>
+            <a:ext cx="2516271" cy="923330"/>
+          </a:xfrm>
+          <a:prstGeom prst="rect">
+            <a:avLst/>
+          </a:prstGeom>
+          <a:solidFill>
+            <a:schemeClr val="accent1"/>
+          </a:solidFill>
+        </p:spPr>
+        <p:txBody>
+          <a:bodyPr wrap="square" rtlCol="0">
+            <a:spAutoFit/>
+          </a:bodyPr>
+          <a:lstStyle/>
+          <a:p>
+            <a:r>
+              <a:rPr lang="en-US" b="1" dirty="0" smtClean="0">
+                <a:solidFill>
+                  <a:schemeClr val="bg2">
+                    <a:lumMod val="50000"/>
+                  </a:schemeClr>
+                </a:solidFill>
+              </a:rPr>
+              <a:t>Main thread calls QObject 1’s simple function</a:t>
+            </a:r>
+            <a:endParaRPr lang="en-US" b="1" dirty="0">
+              <a:solidFill>
+                <a:schemeClr val="bg2">
+                  <a:lumMod val="50000"/>
+                </a:schemeClr>
+              </a:solidFill>
+            </a:endParaRPr>
+          </a:p>
+        </p:txBody>
+      </p:sp>
     </p:spTree>
     <p:extLst>
       <p:ext uri="{BB962C8B-B14F-4D97-AF65-F5344CB8AC3E}">
@@ -7961,6 +9276,193 @@
           </a:p>
         </p:txBody>
       </p:sp>
+      <p:cxnSp>
+        <p:nvCxnSpPr>
+          <p:cNvPr id="7" name="Straight Arrow Connector 6"/>
+          <p:cNvCxnSpPr/>
+          <p:nvPr/>
+        </p:nvCxnSpPr>
+        <p:spPr>
+          <a:xfrm>
+            <a:off x="2880350" y="4274567"/>
+            <a:ext cx="1150625" cy="109864"/>
+          </a:xfrm>
+          <a:prstGeom prst="straightConnector1">
+            <a:avLst/>
+          </a:prstGeom>
+          <a:ln>
+            <a:tailEnd type="triangle"/>
+          </a:ln>
+        </p:spPr>
+        <p:style>
+          <a:lnRef idx="3">
+            <a:schemeClr val="accent1"/>
+          </a:lnRef>
+          <a:fillRef idx="0">
+            <a:schemeClr val="accent1"/>
+          </a:fillRef>
+          <a:effectRef idx="2">
+            <a:schemeClr val="accent1"/>
+          </a:effectRef>
+          <a:fontRef idx="minor">
+            <a:schemeClr val="tx1"/>
+          </a:fontRef>
+        </p:style>
+      </p:cxnSp>
+      <p:cxnSp>
+        <p:nvCxnSpPr>
+          <p:cNvPr id="9" name="Straight Arrow Connector 8"/>
+          <p:cNvCxnSpPr/>
+          <p:nvPr/>
+        </p:nvCxnSpPr>
+        <p:spPr>
+          <a:xfrm>
+            <a:off x="2948925" y="4027121"/>
+            <a:ext cx="1082050" cy="109864"/>
+          </a:xfrm>
+          <a:prstGeom prst="straightConnector1">
+            <a:avLst/>
+          </a:prstGeom>
+          <a:ln>
+            <a:tailEnd type="triangle"/>
+          </a:ln>
+        </p:spPr>
+        <p:style>
+          <a:lnRef idx="3">
+            <a:schemeClr val="accent1"/>
+          </a:lnRef>
+          <a:fillRef idx="0">
+            <a:schemeClr val="accent1"/>
+          </a:fillRef>
+          <a:effectRef idx="2">
+            <a:schemeClr val="accent1"/>
+          </a:effectRef>
+          <a:fontRef idx="minor">
+            <a:schemeClr val="tx1"/>
+          </a:fontRef>
+        </p:style>
+      </p:cxnSp>
+      <p:sp>
+        <p:nvSpPr>
+          <p:cNvPr id="8" name="TextBox 7"/>
+          <p:cNvSpPr txBox="1"/>
+          <p:nvPr/>
+        </p:nvSpPr>
+        <p:spPr>
+          <a:xfrm>
+            <a:off x="539925" y="3598683"/>
+            <a:ext cx="2516271" cy="923330"/>
+          </a:xfrm>
+          <a:prstGeom prst="rect">
+            <a:avLst/>
+          </a:prstGeom>
+          <a:solidFill>
+            <a:schemeClr val="accent1"/>
+          </a:solidFill>
+        </p:spPr>
+        <p:txBody>
+          <a:bodyPr wrap="square" rtlCol="0">
+            <a:spAutoFit/>
+          </a:bodyPr>
+          <a:lstStyle/>
+          <a:p>
+            <a:r>
+              <a:rPr lang="en-US" b="1" dirty="0" smtClean="0">
+                <a:solidFill>
+                  <a:schemeClr val="bg2">
+                    <a:lumMod val="50000"/>
+                  </a:schemeClr>
+                </a:solidFill>
+              </a:rPr>
+              <a:t>Sequential execution of signal and slot</a:t>
+            </a:r>
+            <a:endParaRPr lang="en-US" b="1" dirty="0">
+              <a:solidFill>
+                <a:schemeClr val="bg2">
+                  <a:lumMod val="50000"/>
+                </a:schemeClr>
+              </a:solidFill>
+            </a:endParaRPr>
+          </a:p>
+        </p:txBody>
+      </p:sp>
+      <p:cxnSp>
+        <p:nvCxnSpPr>
+          <p:cNvPr id="11" name="Straight Arrow Connector 10"/>
+          <p:cNvCxnSpPr/>
+          <p:nvPr/>
+        </p:nvCxnSpPr>
+        <p:spPr>
+          <a:xfrm flipH="1" flipV="1">
+            <a:off x="7819292" y="5216769"/>
+            <a:ext cx="1424023" cy="254385"/>
+          </a:xfrm>
+          <a:prstGeom prst="straightConnector1">
+            <a:avLst/>
+          </a:prstGeom>
+          <a:ln>
+            <a:tailEnd type="triangle"/>
+          </a:ln>
+        </p:spPr>
+        <p:style>
+          <a:lnRef idx="3">
+            <a:schemeClr val="accent1"/>
+          </a:lnRef>
+          <a:fillRef idx="0">
+            <a:schemeClr val="accent1"/>
+          </a:fillRef>
+          <a:effectRef idx="2">
+            <a:schemeClr val="accent1"/>
+          </a:effectRef>
+          <a:fontRef idx="minor">
+            <a:schemeClr val="tx1"/>
+          </a:fontRef>
+        </p:style>
+      </p:cxnSp>
+      <p:sp>
+        <p:nvSpPr>
+          <p:cNvPr id="10" name="TextBox 9"/>
+          <p:cNvSpPr txBox="1"/>
+          <p:nvPr/>
+        </p:nvSpPr>
+        <p:spPr>
+          <a:xfrm>
+            <a:off x="9135805" y="5064421"/>
+            <a:ext cx="2516271" cy="923330"/>
+          </a:xfrm>
+          <a:prstGeom prst="rect">
+            <a:avLst/>
+          </a:prstGeom>
+          <a:solidFill>
+            <a:schemeClr val="accent1"/>
+          </a:solidFill>
+        </p:spPr>
+        <p:txBody>
+          <a:bodyPr wrap="square" rtlCol="0">
+            <a:spAutoFit/>
+          </a:bodyPr>
+          <a:lstStyle/>
+          <a:p>
+            <a:r>
+              <a:rPr lang="en-US" b="1" dirty="0" smtClean="0">
+                <a:solidFill>
+                  <a:schemeClr val="bg2">
+                    <a:lumMod val="50000"/>
+                  </a:schemeClr>
+                </a:solidFill>
+              </a:rPr>
+              <a:t>Returns back to function that emitted the signal</a:t>
+            </a:r>
+            <a:endParaRPr lang="en-US" b="1" dirty="0">
+              <a:solidFill>
+                <a:schemeClr val="bg2">
+                  <a:lumMod val="50000"/>
+                </a:schemeClr>
+              </a:solidFill>
+            </a:endParaRPr>
+          </a:p>
+        </p:txBody>
+      </p:sp>
     </p:spTree>
     <p:extLst>
       <p:ext uri="{BB962C8B-B14F-4D97-AF65-F5344CB8AC3E}">
@@ -8056,15 +9558,19 @@
             </a:r>
             <a:r>
               <a:rPr lang="en-US" dirty="0" smtClean="0"/>
-              <a:t> Multithreading</a:t>
-            </a:r>
-          </a:p>
-          <a:p>
-            <a:r>
-              <a:rPr lang="en-US" dirty="0" err="1" smtClean="0"/>
+              <a:t> </a:t>
+            </a:r>
+            <a:r>
+              <a:rPr lang="en-US" dirty="0" smtClean="0"/>
+              <a:t>Multithreading Overview</a:t>
+            </a:r>
+            <a:endParaRPr lang="en-US" dirty="0" smtClean="0"/>
+          </a:p>
+          <a:p>
+            <a:r>
+              <a:rPr lang="en-US" dirty="0" smtClean="0"/>
               <a:t>QThread</a:t>
             </a:r>
-            <a:endParaRPr lang="en-US" dirty="0" smtClean="0"/>
           </a:p>
           <a:p>
             <a:r>
@@ -8179,11 +9685,7 @@
           <a:p>
             <a:r>
               <a:rPr lang="en-US" dirty="0" smtClean="0"/>
-              <a:t>When a signal is emitted, it is placed on the event queue of the </a:t>
-            </a:r>
-            <a:r>
-              <a:rPr lang="en-US" dirty="0" err="1" smtClean="0"/>
-              <a:t>QObject</a:t>
+              <a:t>When a signal is emitted, it is placed on the event queue of the QObject</a:t>
             </a:r>
             <a:r>
               <a:rPr lang="en-US" dirty="0"/>
@@ -8201,8 +9703,17 @@
             </a:r>
             <a:r>
               <a:rPr lang="en-US" dirty="0" smtClean="0"/>
-              <a:t>fter the signal is emitted, execution of the code after the signal continues.</a:t>
-            </a:r>
+              <a:t>fter the signal is emitted, </a:t>
+            </a:r>
+            <a:r>
+              <a:rPr lang="en-US" dirty="0" smtClean="0"/>
+              <a:t>the QObject that emitted the signals continues to execute the next instruction</a:t>
+            </a:r>
+            <a:r>
+              <a:rPr lang="en-US" dirty="0" smtClean="0"/>
+              <a:t>.</a:t>
+            </a:r>
+            <a:endParaRPr lang="en-US" dirty="0" smtClean="0"/>
           </a:p>
           <a:p>
             <a:r>
@@ -8370,6 +9881,147 @@
           </a:prstGeom>
         </p:spPr>
       </p:pic>
+      <p:sp>
+        <p:nvSpPr>
+          <p:cNvPr id="7" name="TextBox 6"/>
+          <p:cNvSpPr txBox="1"/>
+          <p:nvPr/>
+        </p:nvSpPr>
+        <p:spPr>
+          <a:xfrm>
+            <a:off x="3925113" y="1632658"/>
+            <a:ext cx="2516271" cy="1477328"/>
+          </a:xfrm>
+          <a:prstGeom prst="rect">
+            <a:avLst/>
+          </a:prstGeom>
+          <a:solidFill>
+            <a:schemeClr val="accent1"/>
+          </a:solidFill>
+        </p:spPr>
+        <p:txBody>
+          <a:bodyPr wrap="square" rtlCol="0">
+            <a:spAutoFit/>
+          </a:bodyPr>
+          <a:lstStyle/>
+          <a:p>
+            <a:r>
+              <a:rPr lang="en-US" b="1" dirty="0" smtClean="0">
+                <a:solidFill>
+                  <a:schemeClr val="bg2">
+                    <a:lumMod val="50000"/>
+                  </a:schemeClr>
+                </a:solidFill>
+              </a:rPr>
+              <a:t>This example uses the same </a:t>
+            </a:r>
+            <a:r>
+              <a:rPr lang="en-US" b="1" dirty="0" err="1" smtClean="0">
+                <a:solidFill>
+                  <a:schemeClr val="bg2">
+                    <a:lumMod val="50000"/>
+                  </a:schemeClr>
+                </a:solidFill>
+              </a:rPr>
+              <a:t>QObjectSubclass</a:t>
+            </a:r>
+            <a:r>
+              <a:rPr lang="en-US" b="1" dirty="0" smtClean="0">
+                <a:solidFill>
+                  <a:schemeClr val="bg2">
+                    <a:lumMod val="50000"/>
+                  </a:schemeClr>
+                </a:solidFill>
+              </a:rPr>
+              <a:t> from the last example</a:t>
+            </a:r>
+            <a:endParaRPr lang="en-US" b="1" dirty="0">
+              <a:solidFill>
+                <a:schemeClr val="bg2">
+                  <a:lumMod val="50000"/>
+                </a:schemeClr>
+              </a:solidFill>
+            </a:endParaRPr>
+          </a:p>
+        </p:txBody>
+      </p:sp>
+      <p:cxnSp>
+        <p:nvCxnSpPr>
+          <p:cNvPr id="9" name="Straight Arrow Connector 8"/>
+          <p:cNvCxnSpPr/>
+          <p:nvPr/>
+        </p:nvCxnSpPr>
+        <p:spPr>
+          <a:xfrm flipH="1" flipV="1">
+            <a:off x="4067908" y="5141291"/>
+            <a:ext cx="2093082" cy="552458"/>
+          </a:xfrm>
+          <a:prstGeom prst="straightConnector1">
+            <a:avLst/>
+          </a:prstGeom>
+          <a:ln>
+            <a:tailEnd type="triangle"/>
+          </a:ln>
+        </p:spPr>
+        <p:style>
+          <a:lnRef idx="3">
+            <a:schemeClr val="accent1"/>
+          </a:lnRef>
+          <a:fillRef idx="0">
+            <a:schemeClr val="accent1"/>
+          </a:fillRef>
+          <a:effectRef idx="2">
+            <a:schemeClr val="accent1"/>
+          </a:effectRef>
+          <a:fontRef idx="minor">
+            <a:schemeClr val="tx1"/>
+          </a:fontRef>
+        </p:style>
+      </p:cxnSp>
+      <p:sp>
+        <p:nvSpPr>
+          <p:cNvPr id="8" name="TextBox 7"/>
+          <p:cNvSpPr txBox="1"/>
+          <p:nvPr/>
+        </p:nvSpPr>
+        <p:spPr>
+          <a:xfrm>
+            <a:off x="5880594" y="5370583"/>
+            <a:ext cx="2516271" cy="646331"/>
+          </a:xfrm>
+          <a:prstGeom prst="rect">
+            <a:avLst/>
+          </a:prstGeom>
+          <a:solidFill>
+            <a:schemeClr val="accent1"/>
+          </a:solidFill>
+        </p:spPr>
+        <p:txBody>
+          <a:bodyPr wrap="square" rtlCol="0">
+            <a:spAutoFit/>
+          </a:bodyPr>
+          <a:lstStyle/>
+          <a:p>
+            <a:r>
+              <a:rPr lang="en-US" b="1" dirty="0" smtClean="0">
+                <a:solidFill>
+                  <a:schemeClr val="bg2">
+                    <a:lumMod val="50000"/>
+                  </a:schemeClr>
+                </a:solidFill>
+              </a:rPr>
+              <a:t>Moves QObject 2 to a QThread</a:t>
+            </a:r>
+            <a:endParaRPr lang="en-US" b="1" dirty="0">
+              <a:solidFill>
+                <a:schemeClr val="bg2">
+                  <a:lumMod val="50000"/>
+                </a:schemeClr>
+              </a:solidFill>
+            </a:endParaRPr>
+          </a:p>
+        </p:txBody>
+      </p:sp>
     </p:spTree>
     <p:extLst>
       <p:ext uri="{BB962C8B-B14F-4D97-AF65-F5344CB8AC3E}">
@@ -8482,6 +10134,193 @@
           </a:p>
         </p:txBody>
       </p:sp>
+      <p:cxnSp>
+        <p:nvCxnSpPr>
+          <p:cNvPr id="8" name="Straight Arrow Connector 7"/>
+          <p:cNvCxnSpPr/>
+          <p:nvPr/>
+        </p:nvCxnSpPr>
+        <p:spPr>
+          <a:xfrm>
+            <a:off x="3218498" y="3382125"/>
+            <a:ext cx="966640" cy="826460"/>
+          </a:xfrm>
+          <a:prstGeom prst="straightConnector1">
+            <a:avLst/>
+          </a:prstGeom>
+          <a:ln>
+            <a:tailEnd type="triangle"/>
+          </a:ln>
+        </p:spPr>
+        <p:style>
+          <a:lnRef idx="3">
+            <a:schemeClr val="accent1"/>
+          </a:lnRef>
+          <a:fillRef idx="0">
+            <a:schemeClr val="accent1"/>
+          </a:fillRef>
+          <a:effectRef idx="2">
+            <a:schemeClr val="accent1"/>
+          </a:effectRef>
+          <a:fontRef idx="minor">
+            <a:schemeClr val="tx1"/>
+          </a:fontRef>
+        </p:style>
+      </p:cxnSp>
+      <p:sp>
+        <p:nvSpPr>
+          <p:cNvPr id="6" name="TextBox 5"/>
+          <p:cNvSpPr txBox="1"/>
+          <p:nvPr/>
+        </p:nvSpPr>
+        <p:spPr>
+          <a:xfrm>
+            <a:off x="816225" y="2920460"/>
+            <a:ext cx="2516271" cy="923330"/>
+          </a:xfrm>
+          <a:prstGeom prst="rect">
+            <a:avLst/>
+          </a:prstGeom>
+          <a:solidFill>
+            <a:schemeClr val="accent1"/>
+          </a:solidFill>
+        </p:spPr>
+        <p:txBody>
+          <a:bodyPr wrap="square" rtlCol="0">
+            <a:spAutoFit/>
+          </a:bodyPr>
+          <a:lstStyle/>
+          <a:p>
+            <a:r>
+              <a:rPr lang="en-US" b="1" dirty="0" smtClean="0">
+                <a:solidFill>
+                  <a:schemeClr val="bg2">
+                    <a:lumMod val="50000"/>
+                  </a:schemeClr>
+                </a:solidFill>
+              </a:rPr>
+              <a:t>Signal is emitted from Object 1 on the main thread</a:t>
+            </a:r>
+            <a:endParaRPr lang="en-US" b="1" dirty="0">
+              <a:solidFill>
+                <a:schemeClr val="bg2">
+                  <a:lumMod val="50000"/>
+                </a:schemeClr>
+              </a:solidFill>
+            </a:endParaRPr>
+          </a:p>
+        </p:txBody>
+      </p:sp>
+      <p:cxnSp>
+        <p:nvCxnSpPr>
+          <p:cNvPr id="9" name="Straight Arrow Connector 8"/>
+          <p:cNvCxnSpPr/>
+          <p:nvPr/>
+        </p:nvCxnSpPr>
+        <p:spPr>
+          <a:xfrm flipH="1" flipV="1">
+            <a:off x="7115908" y="4752678"/>
+            <a:ext cx="2378787" cy="271098"/>
+          </a:xfrm>
+          <a:prstGeom prst="straightConnector1">
+            <a:avLst/>
+          </a:prstGeom>
+          <a:ln>
+            <a:tailEnd type="triangle"/>
+          </a:ln>
+        </p:spPr>
+        <p:style>
+          <a:lnRef idx="3">
+            <a:schemeClr val="accent1"/>
+          </a:lnRef>
+          <a:fillRef idx="0">
+            <a:schemeClr val="accent1"/>
+          </a:fillRef>
+          <a:effectRef idx="2">
+            <a:schemeClr val="accent1"/>
+          </a:effectRef>
+          <a:fontRef idx="minor">
+            <a:schemeClr val="tx1"/>
+          </a:fontRef>
+        </p:style>
+      </p:cxnSp>
+      <p:cxnSp>
+        <p:nvCxnSpPr>
+          <p:cNvPr id="10" name="Straight Arrow Connector 9"/>
+          <p:cNvCxnSpPr/>
+          <p:nvPr/>
+        </p:nvCxnSpPr>
+        <p:spPr>
+          <a:xfrm flipH="1" flipV="1">
+            <a:off x="7690338" y="4501662"/>
+            <a:ext cx="1788283" cy="76217"/>
+          </a:xfrm>
+          <a:prstGeom prst="straightConnector1">
+            <a:avLst/>
+          </a:prstGeom>
+          <a:ln>
+            <a:tailEnd type="triangle"/>
+          </a:ln>
+        </p:spPr>
+        <p:style>
+          <a:lnRef idx="3">
+            <a:schemeClr val="accent1"/>
+          </a:lnRef>
+          <a:fillRef idx="0">
+            <a:schemeClr val="accent1"/>
+          </a:fillRef>
+          <a:effectRef idx="2">
+            <a:schemeClr val="accent1"/>
+          </a:effectRef>
+          <a:fontRef idx="minor">
+            <a:schemeClr val="tx1"/>
+          </a:fontRef>
+        </p:style>
+      </p:cxnSp>
+      <p:sp>
+        <p:nvSpPr>
+          <p:cNvPr id="7" name="TextBox 6"/>
+          <p:cNvSpPr txBox="1"/>
+          <p:nvPr/>
+        </p:nvSpPr>
+        <p:spPr>
+          <a:xfrm>
+            <a:off x="9296790" y="4296525"/>
+            <a:ext cx="2516271" cy="1200329"/>
+          </a:xfrm>
+          <a:prstGeom prst="rect">
+            <a:avLst/>
+          </a:prstGeom>
+          <a:solidFill>
+            <a:schemeClr val="accent1"/>
+          </a:solidFill>
+        </p:spPr>
+        <p:txBody>
+          <a:bodyPr wrap="square" rtlCol="0">
+            <a:spAutoFit/>
+          </a:bodyPr>
+          <a:lstStyle/>
+          <a:p>
+            <a:r>
+              <a:rPr lang="en-US" b="1" dirty="0" smtClean="0">
+                <a:solidFill>
+                  <a:schemeClr val="bg2">
+                    <a:lumMod val="50000"/>
+                  </a:schemeClr>
+                </a:solidFill>
+              </a:rPr>
+              <a:t>QObject 1 and QObject 2 now execute on different threads</a:t>
+            </a:r>
+            <a:endParaRPr lang="en-US" b="1" dirty="0">
+              <a:solidFill>
+                <a:schemeClr val="bg2">
+                  <a:lumMod val="50000"/>
+                </a:schemeClr>
+              </a:solidFill>
+            </a:endParaRPr>
+          </a:p>
+        </p:txBody>
+      </p:sp>
     </p:spTree>
     <p:extLst>
       <p:ext uri="{BB962C8B-B14F-4D97-AF65-F5344CB8AC3E}">
@@ -8557,7 +10396,44 @@
           <a:bodyPr/>
           <a:lstStyle/>
           <a:p>
-            <a:endParaRPr lang="en-US"/>
+            <a:r>
+              <a:rPr lang="en-US" dirty="0" smtClean="0"/>
+              <a:t>A signal can be connected to multiple slots, and a slot can be connected to multiple signals</a:t>
+            </a:r>
+          </a:p>
+          <a:p>
+            <a:r>
+              <a:rPr lang="en-US" dirty="0" smtClean="0"/>
+              <a:t>Signal and Slots can pass non primitive data types </a:t>
+            </a:r>
+          </a:p>
+          <a:p>
+            <a:pPr lvl="1"/>
+            <a:r>
+              <a:rPr lang="en-US" dirty="0" smtClean="0"/>
+              <a:t>Must register non primitive data type</a:t>
+            </a:r>
+          </a:p>
+          <a:p>
+            <a:pPr lvl="1"/>
+            <a:r>
+              <a:rPr lang="en-US" dirty="0" smtClean="0"/>
+              <a:t>All references will be converted to copies</a:t>
+            </a:r>
+            <a:endParaRPr lang="en-US" dirty="0"/>
+          </a:p>
+          <a:p>
+            <a:r>
+              <a:rPr lang="en-US" dirty="0" smtClean="0"/>
+              <a:t>Signals can be connected to other signals</a:t>
+            </a:r>
+          </a:p>
+          <a:p>
+            <a:r>
+              <a:rPr lang="en-US" dirty="0" smtClean="0"/>
+              <a:t>The signal’s number of parameters must be greater than or equal to the slot’s number of parameters</a:t>
+            </a:r>
+            <a:endParaRPr lang="en-US" dirty="0"/>
           </a:p>
         </p:txBody>
       </p:sp>
@@ -8688,6 +10564,85 @@
           </a:p>
         </p:txBody>
       </p:sp>
+      <p:sp>
+        <p:nvSpPr>
+          <p:cNvPr id="6" name="TextBox 5"/>
+          <p:cNvSpPr txBox="1"/>
+          <p:nvPr/>
+        </p:nvSpPr>
+        <p:spPr>
+          <a:xfrm>
+            <a:off x="2696308" y="4010706"/>
+            <a:ext cx="1691265" cy="369332"/>
+          </a:xfrm>
+          <a:prstGeom prst="rect">
+            <a:avLst/>
+          </a:prstGeom>
+          <a:solidFill>
+            <a:schemeClr val="accent1"/>
+          </a:solidFill>
+        </p:spPr>
+        <p:txBody>
+          <a:bodyPr wrap="square" rtlCol="0">
+            <a:spAutoFit/>
+          </a:bodyPr>
+          <a:lstStyle/>
+          <a:p>
+            <a:r>
+              <a:rPr lang="en-US" b="1" dirty="0" smtClean="0">
+                <a:solidFill>
+                  <a:schemeClr val="bg2">
+                    <a:lumMod val="50000"/>
+                  </a:schemeClr>
+                </a:solidFill>
+              </a:rPr>
+              <a:t>Emits a signal</a:t>
+            </a:r>
+            <a:endParaRPr lang="en-US" b="1" dirty="0">
+              <a:solidFill>
+                <a:schemeClr val="bg2">
+                  <a:lumMod val="50000"/>
+                </a:schemeClr>
+              </a:solidFill>
+            </a:endParaRPr>
+          </a:p>
+        </p:txBody>
+      </p:sp>
+      <p:cxnSp>
+        <p:nvCxnSpPr>
+          <p:cNvPr id="7" name="Straight Arrow Connector 6"/>
+          <p:cNvCxnSpPr>
+            <a:stCxn id="6" idx="3"/>
+          </p:cNvCxnSpPr>
+          <p:nvPr/>
+        </p:nvCxnSpPr>
+        <p:spPr>
+          <a:xfrm>
+            <a:off x="4387573" y="4195372"/>
+            <a:ext cx="1462242" cy="400074"/>
+          </a:xfrm>
+          <a:prstGeom prst="straightConnector1">
+            <a:avLst/>
+          </a:prstGeom>
+          <a:ln>
+            <a:tailEnd type="triangle"/>
+          </a:ln>
+        </p:spPr>
+        <p:style>
+          <a:lnRef idx="3">
+            <a:schemeClr val="accent1"/>
+          </a:lnRef>
+          <a:fillRef idx="0">
+            <a:schemeClr val="accent1"/>
+          </a:fillRef>
+          <a:effectRef idx="2">
+            <a:schemeClr val="accent1"/>
+          </a:effectRef>
+          <a:fontRef idx="minor">
+            <a:schemeClr val="tx1"/>
+          </a:fontRef>
+        </p:style>
+      </p:cxnSp>
     </p:spTree>
     <p:extLst>
       <p:ext uri="{BB962C8B-B14F-4D97-AF65-F5344CB8AC3E}">
@@ -8830,6 +10785,203 @@
           </a:p>
         </p:txBody>
       </p:sp>
+      <p:sp>
+        <p:nvSpPr>
+          <p:cNvPr id="7" name="TextBox 6"/>
+          <p:cNvSpPr txBox="1"/>
+          <p:nvPr/>
+        </p:nvSpPr>
+        <p:spPr>
+          <a:xfrm>
+            <a:off x="4103077" y="1530082"/>
+            <a:ext cx="2123728" cy="646331"/>
+          </a:xfrm>
+          <a:prstGeom prst="rect">
+            <a:avLst/>
+          </a:prstGeom>
+          <a:solidFill>
+            <a:schemeClr val="accent1"/>
+          </a:solidFill>
+        </p:spPr>
+        <p:txBody>
+          <a:bodyPr wrap="square" rtlCol="0">
+            <a:spAutoFit/>
+          </a:bodyPr>
+          <a:lstStyle/>
+          <a:p>
+            <a:r>
+              <a:rPr lang="en-US" b="1" dirty="0" smtClean="0">
+                <a:solidFill>
+                  <a:schemeClr val="bg2">
+                    <a:lumMod val="50000"/>
+                  </a:schemeClr>
+                </a:solidFill>
+              </a:rPr>
+              <a:t>Modifications to </a:t>
+            </a:r>
+            <a:r>
+              <a:rPr lang="en-US" b="1" dirty="0" err="1" smtClean="0">
+                <a:solidFill>
+                  <a:schemeClr val="bg2">
+                    <a:lumMod val="50000"/>
+                  </a:schemeClr>
+                </a:solidFill>
+              </a:rPr>
+              <a:t>QObjectSubclass</a:t>
+            </a:r>
+            <a:endParaRPr lang="en-US" b="1" dirty="0">
+              <a:solidFill>
+                <a:schemeClr val="bg2">
+                  <a:lumMod val="50000"/>
+                </a:schemeClr>
+              </a:solidFill>
+            </a:endParaRPr>
+          </a:p>
+        </p:txBody>
+      </p:sp>
+      <p:cxnSp>
+        <p:nvCxnSpPr>
+          <p:cNvPr id="9" name="Straight Arrow Connector 8"/>
+          <p:cNvCxnSpPr/>
+          <p:nvPr/>
+        </p:nvCxnSpPr>
+        <p:spPr>
+          <a:xfrm flipV="1">
+            <a:off x="6226805" y="2876678"/>
+            <a:ext cx="1299410" cy="1030561"/>
+          </a:xfrm>
+          <a:prstGeom prst="straightConnector1">
+            <a:avLst/>
+          </a:prstGeom>
+          <a:ln>
+            <a:tailEnd type="triangle"/>
+          </a:ln>
+        </p:spPr>
+        <p:style>
+          <a:lnRef idx="3">
+            <a:schemeClr val="accent1"/>
+          </a:lnRef>
+          <a:fillRef idx="0">
+            <a:schemeClr val="accent1"/>
+          </a:fillRef>
+          <a:effectRef idx="2">
+            <a:schemeClr val="accent1"/>
+          </a:effectRef>
+          <a:fontRef idx="minor">
+            <a:schemeClr val="tx1"/>
+          </a:fontRef>
+        </p:style>
+      </p:cxnSp>
+      <p:cxnSp>
+        <p:nvCxnSpPr>
+          <p:cNvPr id="10" name="Straight Arrow Connector 9"/>
+          <p:cNvCxnSpPr/>
+          <p:nvPr/>
+        </p:nvCxnSpPr>
+        <p:spPr>
+          <a:xfrm flipH="1" flipV="1">
+            <a:off x="4249732" y="3172404"/>
+            <a:ext cx="880915" cy="626486"/>
+          </a:xfrm>
+          <a:prstGeom prst="straightConnector1">
+            <a:avLst/>
+          </a:prstGeom>
+          <a:ln>
+            <a:tailEnd type="triangle"/>
+          </a:ln>
+        </p:spPr>
+        <p:style>
+          <a:lnRef idx="3">
+            <a:schemeClr val="accent1"/>
+          </a:lnRef>
+          <a:fillRef idx="0">
+            <a:schemeClr val="accent1"/>
+          </a:fillRef>
+          <a:effectRef idx="2">
+            <a:schemeClr val="accent1"/>
+          </a:effectRef>
+          <a:fontRef idx="minor">
+            <a:schemeClr val="tx1"/>
+          </a:fontRef>
+        </p:style>
+      </p:cxnSp>
+      <p:cxnSp>
+        <p:nvCxnSpPr>
+          <p:cNvPr id="11" name="Straight Arrow Connector 10"/>
+          <p:cNvCxnSpPr/>
+          <p:nvPr/>
+        </p:nvCxnSpPr>
+        <p:spPr>
+          <a:xfrm flipH="1">
+            <a:off x="4337538" y="4016560"/>
+            <a:ext cx="801832" cy="651977"/>
+          </a:xfrm>
+          <a:prstGeom prst="straightConnector1">
+            <a:avLst/>
+          </a:prstGeom>
+          <a:ln>
+            <a:tailEnd type="triangle"/>
+          </a:ln>
+        </p:spPr>
+        <p:style>
+          <a:lnRef idx="3">
+            <a:schemeClr val="accent1"/>
+          </a:lnRef>
+          <a:fillRef idx="0">
+            <a:schemeClr val="accent1"/>
+          </a:fillRef>
+          <a:effectRef idx="2">
+            <a:schemeClr val="accent1"/>
+          </a:effectRef>
+          <a:fontRef idx="minor">
+            <a:schemeClr val="tx1"/>
+          </a:fontRef>
+        </p:style>
+      </p:cxnSp>
+      <p:sp>
+        <p:nvSpPr>
+          <p:cNvPr id="8" name="TextBox 7"/>
+          <p:cNvSpPr txBox="1"/>
+          <p:nvPr/>
+        </p:nvSpPr>
+        <p:spPr>
+          <a:xfrm>
+            <a:off x="5070701" y="3722573"/>
+            <a:ext cx="1223442" cy="369332"/>
+          </a:xfrm>
+          <a:prstGeom prst="rect">
+            <a:avLst/>
+          </a:prstGeom>
+          <a:solidFill>
+            <a:schemeClr val="accent1"/>
+          </a:solidFill>
+        </p:spPr>
+        <p:txBody>
+          <a:bodyPr wrap="square" rtlCol="0">
+            <a:spAutoFit/>
+          </a:bodyPr>
+          <a:lstStyle/>
+          <a:p>
+            <a:r>
+              <a:rPr lang="en-US" b="1" dirty="0" smtClean="0">
+                <a:solidFill>
+                  <a:schemeClr val="bg2">
+                    <a:lumMod val="50000"/>
+                  </a:schemeClr>
+                </a:solidFill>
+              </a:rPr>
+              <a:t>New slots</a:t>
+            </a:r>
+            <a:endParaRPr lang="en-US" b="1" dirty="0">
+              <a:solidFill>
+                <a:schemeClr val="bg2">
+                  <a:lumMod val="50000"/>
+                </a:schemeClr>
+              </a:solidFill>
+            </a:endParaRPr>
+          </a:p>
+        </p:txBody>
+      </p:sp>
     </p:spTree>
     <p:extLst>
       <p:ext uri="{BB962C8B-B14F-4D97-AF65-F5344CB8AC3E}">
@@ -8997,6 +11149,303 @@
           </a:p>
         </p:txBody>
       </p:sp>
+      <p:cxnSp>
+        <p:nvCxnSpPr>
+          <p:cNvPr id="10" name="Straight Arrow Connector 9"/>
+          <p:cNvCxnSpPr/>
+          <p:nvPr/>
+        </p:nvCxnSpPr>
+        <p:spPr>
+          <a:xfrm>
+            <a:off x="3698523" y="2907685"/>
+            <a:ext cx="958125" cy="728508"/>
+          </a:xfrm>
+          <a:prstGeom prst="straightConnector1">
+            <a:avLst/>
+          </a:prstGeom>
+          <a:ln>
+            <a:tailEnd type="triangle"/>
+          </a:ln>
+        </p:spPr>
+        <p:style>
+          <a:lnRef idx="3">
+            <a:schemeClr val="accent1"/>
+          </a:lnRef>
+          <a:fillRef idx="0">
+            <a:schemeClr val="accent1"/>
+          </a:fillRef>
+          <a:effectRef idx="2">
+            <a:schemeClr val="accent1"/>
+          </a:effectRef>
+          <a:fontRef idx="minor">
+            <a:schemeClr val="tx1"/>
+          </a:fontRef>
+        </p:style>
+      </p:cxnSp>
+      <p:cxnSp>
+        <p:nvCxnSpPr>
+          <p:cNvPr id="11" name="Straight Arrow Connector 10"/>
+          <p:cNvCxnSpPr/>
+          <p:nvPr/>
+        </p:nvCxnSpPr>
+        <p:spPr>
+          <a:xfrm flipH="1">
+            <a:off x="6576646" y="5848513"/>
+            <a:ext cx="1418933" cy="364254"/>
+          </a:xfrm>
+          <a:prstGeom prst="straightConnector1">
+            <a:avLst/>
+          </a:prstGeom>
+          <a:ln>
+            <a:tailEnd type="triangle"/>
+          </a:ln>
+        </p:spPr>
+        <p:style>
+          <a:lnRef idx="3">
+            <a:schemeClr val="accent1"/>
+          </a:lnRef>
+          <a:fillRef idx="0">
+            <a:schemeClr val="accent1"/>
+          </a:fillRef>
+          <a:effectRef idx="2">
+            <a:schemeClr val="accent1"/>
+          </a:effectRef>
+          <a:fontRef idx="minor">
+            <a:schemeClr val="tx1"/>
+          </a:fontRef>
+        </p:style>
+      </p:cxnSp>
+      <p:cxnSp>
+        <p:nvCxnSpPr>
+          <p:cNvPr id="13" name="Straight Arrow Connector 12"/>
+          <p:cNvCxnSpPr/>
+          <p:nvPr/>
+        </p:nvCxnSpPr>
+        <p:spPr>
+          <a:xfrm flipV="1">
+            <a:off x="8705046" y="3927231"/>
+            <a:ext cx="392062" cy="1278518"/>
+          </a:xfrm>
+          <a:prstGeom prst="straightConnector1">
+            <a:avLst/>
+          </a:prstGeom>
+          <a:ln>
+            <a:tailEnd type="triangle"/>
+          </a:ln>
+        </p:spPr>
+        <p:style>
+          <a:lnRef idx="3">
+            <a:schemeClr val="accent1"/>
+          </a:lnRef>
+          <a:fillRef idx="0">
+            <a:schemeClr val="accent1"/>
+          </a:fillRef>
+          <a:effectRef idx="2">
+            <a:schemeClr val="accent1"/>
+          </a:effectRef>
+          <a:fontRef idx="minor">
+            <a:schemeClr val="tx1"/>
+          </a:fontRef>
+        </p:style>
+      </p:cxnSp>
+      <p:cxnSp>
+        <p:nvCxnSpPr>
+          <p:cNvPr id="16" name="Straight Arrow Connector 15"/>
+          <p:cNvCxnSpPr/>
+          <p:nvPr/>
+        </p:nvCxnSpPr>
+        <p:spPr>
+          <a:xfrm flipV="1">
+            <a:off x="3825331" y="3847376"/>
+            <a:ext cx="922515" cy="970837"/>
+          </a:xfrm>
+          <a:prstGeom prst="straightConnector1">
+            <a:avLst/>
+          </a:prstGeom>
+          <a:ln>
+            <a:tailEnd type="triangle"/>
+          </a:ln>
+        </p:spPr>
+        <p:style>
+          <a:lnRef idx="3">
+            <a:schemeClr val="accent1"/>
+          </a:lnRef>
+          <a:fillRef idx="0">
+            <a:schemeClr val="accent1"/>
+          </a:fillRef>
+          <a:effectRef idx="2">
+            <a:schemeClr val="accent1"/>
+          </a:effectRef>
+          <a:fontRef idx="minor">
+            <a:schemeClr val="tx1"/>
+          </a:fontRef>
+        </p:style>
+      </p:cxnSp>
+      <p:cxnSp>
+        <p:nvCxnSpPr>
+          <p:cNvPr id="17" name="Straight Arrow Connector 16"/>
+          <p:cNvCxnSpPr/>
+          <p:nvPr/>
+        </p:nvCxnSpPr>
+        <p:spPr>
+          <a:xfrm>
+            <a:off x="3817778" y="5182467"/>
+            <a:ext cx="1126669" cy="7008"/>
+          </a:xfrm>
+          <a:prstGeom prst="straightConnector1">
+            <a:avLst/>
+          </a:prstGeom>
+          <a:ln>
+            <a:tailEnd type="triangle"/>
+          </a:ln>
+        </p:spPr>
+        <p:style>
+          <a:lnRef idx="3">
+            <a:schemeClr val="accent1"/>
+          </a:lnRef>
+          <a:fillRef idx="0">
+            <a:schemeClr val="accent1"/>
+          </a:fillRef>
+          <a:effectRef idx="2">
+            <a:schemeClr val="accent1"/>
+          </a:effectRef>
+          <a:fontRef idx="minor">
+            <a:schemeClr val="tx1"/>
+          </a:fontRef>
+        </p:style>
+      </p:cxnSp>
+      <p:sp>
+        <p:nvSpPr>
+          <p:cNvPr id="8" name="TextBox 7"/>
+          <p:cNvSpPr txBox="1"/>
+          <p:nvPr/>
+        </p:nvSpPr>
+        <p:spPr>
+          <a:xfrm>
+            <a:off x="2305916" y="2421555"/>
+            <a:ext cx="2123728" cy="923330"/>
+          </a:xfrm>
+          <a:prstGeom prst="rect">
+            <a:avLst/>
+          </a:prstGeom>
+          <a:solidFill>
+            <a:schemeClr val="accent1"/>
+          </a:solidFill>
+        </p:spPr>
+        <p:txBody>
+          <a:bodyPr wrap="square" rtlCol="0">
+            <a:spAutoFit/>
+          </a:bodyPr>
+          <a:lstStyle/>
+          <a:p>
+            <a:r>
+              <a:rPr lang="en-US" b="1" dirty="0" smtClean="0">
+                <a:solidFill>
+                  <a:schemeClr val="bg2">
+                    <a:lumMod val="50000"/>
+                  </a:schemeClr>
+                </a:solidFill>
+              </a:rPr>
+              <a:t>Slot drops signal’s input parameter</a:t>
+            </a:r>
+            <a:endParaRPr lang="en-US" b="1" dirty="0">
+              <a:solidFill>
+                <a:schemeClr val="bg2">
+                  <a:lumMod val="50000"/>
+                </a:schemeClr>
+              </a:solidFill>
+            </a:endParaRPr>
+          </a:p>
+        </p:txBody>
+      </p:sp>
+      <p:sp>
+        <p:nvSpPr>
+          <p:cNvPr id="15" name="TextBox 14"/>
+          <p:cNvSpPr txBox="1"/>
+          <p:nvPr/>
+        </p:nvSpPr>
+        <p:spPr>
+          <a:xfrm>
+            <a:off x="1817304" y="4623391"/>
+            <a:ext cx="2123728" cy="923330"/>
+          </a:xfrm>
+          <a:prstGeom prst="rect">
+            <a:avLst/>
+          </a:prstGeom>
+          <a:solidFill>
+            <a:schemeClr val="accent1"/>
+          </a:solidFill>
+        </p:spPr>
+        <p:txBody>
+          <a:bodyPr wrap="square" rtlCol="0">
+            <a:spAutoFit/>
+          </a:bodyPr>
+          <a:lstStyle/>
+          <a:p>
+            <a:r>
+              <a:rPr lang="en-US" b="1" dirty="0" smtClean="0">
+                <a:solidFill>
+                  <a:schemeClr val="bg2">
+                    <a:lumMod val="50000"/>
+                  </a:schemeClr>
+                </a:solidFill>
+              </a:rPr>
+              <a:t>Signal connected to multiple slots</a:t>
+            </a:r>
+            <a:endParaRPr lang="en-US" b="1" dirty="0">
+              <a:solidFill>
+                <a:schemeClr val="bg2">
+                  <a:lumMod val="50000"/>
+                </a:schemeClr>
+              </a:solidFill>
+            </a:endParaRPr>
+          </a:p>
+        </p:txBody>
+      </p:sp>
+      <p:sp>
+        <p:nvSpPr>
+          <p:cNvPr id="9" name="TextBox 8"/>
+          <p:cNvSpPr txBox="1"/>
+          <p:nvPr/>
+        </p:nvSpPr>
+        <p:spPr>
+          <a:xfrm>
+            <a:off x="7927106" y="5085056"/>
+            <a:ext cx="2123728" cy="1200329"/>
+          </a:xfrm>
+          <a:prstGeom prst="rect">
+            <a:avLst/>
+          </a:prstGeom>
+          <a:solidFill>
+            <a:schemeClr val="accent1"/>
+          </a:solidFill>
+        </p:spPr>
+        <p:txBody>
+          <a:bodyPr wrap="square" rtlCol="0">
+            <a:spAutoFit/>
+          </a:bodyPr>
+          <a:lstStyle/>
+          <a:p>
+            <a:r>
+              <a:rPr lang="en-US" b="1" dirty="0" smtClean="0">
+                <a:solidFill>
+                  <a:schemeClr val="bg2">
+                    <a:lumMod val="50000"/>
+                  </a:schemeClr>
+                </a:solidFill>
+              </a:rPr>
+              <a:t>Signal tells the applications to quit the main event loop</a:t>
+            </a:r>
+            <a:endParaRPr lang="en-US" b="1" dirty="0">
+              <a:solidFill>
+                <a:schemeClr val="bg2">
+                  <a:lumMod val="50000"/>
+                </a:schemeClr>
+              </a:solidFill>
+            </a:endParaRPr>
+          </a:p>
+        </p:txBody>
+      </p:sp>
     </p:spTree>
     <p:extLst>
       <p:ext uri="{BB962C8B-B14F-4D97-AF65-F5344CB8AC3E}">
@@ -9134,6 +11583,226 @@
           </a:prstGeom>
         </p:spPr>
       </p:pic>
+      <p:cxnSp>
+        <p:nvCxnSpPr>
+          <p:cNvPr id="9" name="Straight Arrow Connector 8"/>
+          <p:cNvCxnSpPr/>
+          <p:nvPr/>
+        </p:nvCxnSpPr>
+        <p:spPr>
+          <a:xfrm flipV="1">
+            <a:off x="2235899" y="3791344"/>
+            <a:ext cx="882439" cy="397344"/>
+          </a:xfrm>
+          <a:prstGeom prst="straightConnector1">
+            <a:avLst/>
+          </a:prstGeom>
+          <a:ln>
+            <a:tailEnd type="triangle"/>
+          </a:ln>
+        </p:spPr>
+        <p:style>
+          <a:lnRef idx="3">
+            <a:schemeClr val="accent1"/>
+          </a:lnRef>
+          <a:fillRef idx="0">
+            <a:schemeClr val="accent1"/>
+          </a:fillRef>
+          <a:effectRef idx="2">
+            <a:schemeClr val="accent1"/>
+          </a:effectRef>
+          <a:fontRef idx="minor">
+            <a:schemeClr val="tx1"/>
+          </a:fontRef>
+        </p:style>
+      </p:cxnSp>
+      <p:cxnSp>
+        <p:nvCxnSpPr>
+          <p:cNvPr id="10" name="Straight Arrow Connector 9"/>
+          <p:cNvCxnSpPr/>
+          <p:nvPr/>
+        </p:nvCxnSpPr>
+        <p:spPr>
+          <a:xfrm>
+            <a:off x="2235899" y="4930353"/>
+            <a:ext cx="4352470" cy="849124"/>
+          </a:xfrm>
+          <a:prstGeom prst="straightConnector1">
+            <a:avLst/>
+          </a:prstGeom>
+          <a:ln>
+            <a:tailEnd type="triangle"/>
+          </a:ln>
+        </p:spPr>
+        <p:style>
+          <a:lnRef idx="3">
+            <a:schemeClr val="accent1"/>
+          </a:lnRef>
+          <a:fillRef idx="0">
+            <a:schemeClr val="accent1"/>
+          </a:fillRef>
+          <a:effectRef idx="2">
+            <a:schemeClr val="accent1"/>
+          </a:effectRef>
+          <a:fontRef idx="minor">
+            <a:schemeClr val="tx1"/>
+          </a:fontRef>
+        </p:style>
+      </p:cxnSp>
+      <p:cxnSp>
+        <p:nvCxnSpPr>
+          <p:cNvPr id="12" name="Straight Arrow Connector 11"/>
+          <p:cNvCxnSpPr/>
+          <p:nvPr/>
+        </p:nvCxnSpPr>
+        <p:spPr>
+          <a:xfrm flipH="1">
+            <a:off x="8698523" y="4566294"/>
+            <a:ext cx="1352311" cy="275337"/>
+          </a:xfrm>
+          <a:prstGeom prst="straightConnector1">
+            <a:avLst/>
+          </a:prstGeom>
+          <a:ln>
+            <a:tailEnd type="triangle"/>
+          </a:ln>
+        </p:spPr>
+        <p:style>
+          <a:lnRef idx="3">
+            <a:schemeClr val="accent1"/>
+          </a:lnRef>
+          <a:fillRef idx="0">
+            <a:schemeClr val="accent1"/>
+          </a:fillRef>
+          <a:effectRef idx="2">
+            <a:schemeClr val="accent1"/>
+          </a:effectRef>
+          <a:fontRef idx="minor">
+            <a:schemeClr val="tx1"/>
+          </a:fontRef>
+        </p:style>
+      </p:cxnSp>
+      <p:cxnSp>
+        <p:nvCxnSpPr>
+          <p:cNvPr id="15" name="Straight Arrow Connector 14"/>
+          <p:cNvCxnSpPr/>
+          <p:nvPr/>
+        </p:nvCxnSpPr>
+        <p:spPr>
+          <a:xfrm flipH="1">
+            <a:off x="8698523" y="5017477"/>
+            <a:ext cx="1352311" cy="254743"/>
+          </a:xfrm>
+          <a:prstGeom prst="straightConnector1">
+            <a:avLst/>
+          </a:prstGeom>
+          <a:ln>
+            <a:tailEnd type="triangle"/>
+          </a:ln>
+        </p:spPr>
+        <p:style>
+          <a:lnRef idx="3">
+            <a:schemeClr val="accent1"/>
+          </a:lnRef>
+          <a:fillRef idx="0">
+            <a:schemeClr val="accent1"/>
+          </a:fillRef>
+          <a:effectRef idx="2">
+            <a:schemeClr val="accent1"/>
+          </a:effectRef>
+          <a:fontRef idx="minor">
+            <a:schemeClr val="tx1"/>
+          </a:fontRef>
+        </p:style>
+      </p:cxnSp>
+      <p:sp>
+        <p:nvSpPr>
+          <p:cNvPr id="7" name="TextBox 6"/>
+          <p:cNvSpPr txBox="1"/>
+          <p:nvPr/>
+        </p:nvSpPr>
+        <p:spPr>
+          <a:xfrm>
+            <a:off x="9744183" y="4223821"/>
+            <a:ext cx="2123728" cy="1754326"/>
+          </a:xfrm>
+          <a:prstGeom prst="rect">
+            <a:avLst/>
+          </a:prstGeom>
+          <a:solidFill>
+            <a:schemeClr val="accent1"/>
+          </a:solidFill>
+        </p:spPr>
+        <p:txBody>
+          <a:bodyPr wrap="square" rtlCol="0">
+            <a:spAutoFit/>
+          </a:bodyPr>
+          <a:lstStyle/>
+          <a:p>
+            <a:r>
+              <a:rPr lang="en-US" b="1" dirty="0" smtClean="0">
+                <a:solidFill>
+                  <a:schemeClr val="bg2">
+                    <a:lumMod val="50000"/>
+                  </a:schemeClr>
+                </a:solidFill>
+              </a:rPr>
+              <a:t>Signals stored on the QThread event queue are executed when previous event finished</a:t>
+            </a:r>
+            <a:endParaRPr lang="en-US" b="1" dirty="0">
+              <a:solidFill>
+                <a:schemeClr val="bg2">
+                  <a:lumMod val="50000"/>
+                </a:schemeClr>
+              </a:solidFill>
+            </a:endParaRPr>
+          </a:p>
+        </p:txBody>
+      </p:sp>
+      <p:sp>
+        <p:nvSpPr>
+          <p:cNvPr id="8" name="TextBox 7"/>
+          <p:cNvSpPr txBox="1"/>
+          <p:nvPr/>
+        </p:nvSpPr>
+        <p:spPr>
+          <a:xfrm>
+            <a:off x="326003" y="3952778"/>
+            <a:ext cx="2123728" cy="1200329"/>
+          </a:xfrm>
+          <a:prstGeom prst="rect">
+            <a:avLst/>
+          </a:prstGeom>
+          <a:solidFill>
+            <a:schemeClr val="accent1"/>
+          </a:solidFill>
+        </p:spPr>
+        <p:txBody>
+          <a:bodyPr wrap="square" rtlCol="0">
+            <a:spAutoFit/>
+          </a:bodyPr>
+          <a:lstStyle/>
+          <a:p>
+            <a:r>
+              <a:rPr lang="en-US" b="1" dirty="0" smtClean="0">
+                <a:solidFill>
+                  <a:schemeClr val="bg2">
+                    <a:lumMod val="50000"/>
+                  </a:schemeClr>
+                </a:solidFill>
+              </a:rPr>
+              <a:t>Starting and exiting main application event loop</a:t>
+            </a:r>
+            <a:endParaRPr lang="en-US" b="1" dirty="0">
+              <a:solidFill>
+                <a:schemeClr val="bg2">
+                  <a:lumMod val="50000"/>
+                </a:schemeClr>
+              </a:solidFill>
+            </a:endParaRPr>
+          </a:p>
+        </p:txBody>
+      </p:sp>
     </p:spTree>
     <p:extLst>
       <p:ext uri="{BB962C8B-B14F-4D97-AF65-F5344CB8AC3E}">
@@ -9188,7 +11857,7 @@
           <a:p>
             <a:r>
               <a:rPr lang="en-US" dirty="0" smtClean="0"/>
-              <a:t>References</a:t>
+              <a:t>Links</a:t>
             </a:r>
             <a:endParaRPr lang="en-US" dirty="0"/>
           </a:p>
@@ -9209,14 +11878,99 @@
           <a:bodyPr/>
           <a:lstStyle/>
           <a:p>
-            <a:pPr marL="457200" indent="-457200">
-              <a:buFont typeface="+mj-lt"/>
-              <a:buAutoNum type="arabicPeriod"/>
+            <a:pPr marL="0" indent="0">
+              <a:buNone/>
             </a:pPr>
             <a:r>
-              <a:rPr lang="en-US" dirty="0"/>
-              <a:t>http://doc.qt.io/qt-5/threads-technologies.html</a:t>
-            </a:r>
+              <a:rPr lang="en-US" dirty="0" smtClean="0"/>
+              <a:t>References:</a:t>
+            </a:r>
+            <a:endParaRPr lang="en-US" dirty="0" smtClean="0">
+              <a:hlinkClick r:id="rId2"/>
+            </a:endParaRPr>
+          </a:p>
+          <a:p>
+            <a:pPr marL="0" indent="0">
+              <a:buNone/>
+            </a:pPr>
+            <a:r>
+              <a:rPr lang="en-US" dirty="0" smtClean="0">
+                <a:hlinkClick r:id="rId2"/>
+              </a:rPr>
+              <a:t>http</a:t>
+            </a:r>
+            <a:r>
+              <a:rPr lang="en-US" dirty="0">
+                <a:hlinkClick r:id="rId2"/>
+              </a:rPr>
+              <a:t>://</a:t>
+            </a:r>
+            <a:r>
+              <a:rPr lang="en-US" dirty="0" smtClean="0">
+                <a:hlinkClick r:id="rId2"/>
+              </a:rPr>
+              <a:t>doc.qt.io/qt-5/threads-technologies.html</a:t>
+            </a:r>
+            <a:endParaRPr lang="en-US" dirty="0" smtClean="0"/>
+          </a:p>
+          <a:p>
+            <a:pPr marL="0" indent="0">
+              <a:buNone/>
+            </a:pPr>
+            <a:r>
+              <a:rPr lang="en-US" dirty="0">
+                <a:hlinkClick r:id="rId3"/>
+              </a:rPr>
+              <a:t>https://en.wikipedia.org/wiki/Qt_(software</a:t>
+            </a:r>
+            <a:r>
+              <a:rPr lang="en-US" dirty="0" smtClean="0">
+                <a:hlinkClick r:id="rId3"/>
+              </a:rPr>
+              <a:t>)</a:t>
+            </a:r>
+            <a:r>
+              <a:rPr lang="en-US" dirty="0" smtClean="0"/>
+              <a:t> </a:t>
+            </a:r>
+            <a:endParaRPr lang="en-US" dirty="0" smtClean="0"/>
+          </a:p>
+          <a:p>
+            <a:pPr marL="0" indent="0">
+              <a:buNone/>
+            </a:pPr>
+            <a:endParaRPr lang="en-US" dirty="0"/>
+          </a:p>
+          <a:p>
+            <a:pPr marL="0" indent="0">
+              <a:buNone/>
+            </a:pPr>
+            <a:r>
+              <a:rPr lang="en-US" dirty="0" smtClean="0"/>
+              <a:t>Code Repository:</a:t>
+            </a:r>
+          </a:p>
+          <a:p>
+            <a:pPr marL="0" indent="0">
+              <a:buNone/>
+            </a:pPr>
+            <a:r>
+              <a:rPr lang="en-US" dirty="0">
+                <a:hlinkClick r:id="rId4"/>
+              </a:rPr>
+              <a:t>https://</a:t>
+            </a:r>
+            <a:r>
+              <a:rPr lang="en-US" dirty="0" smtClean="0">
+                <a:hlinkClick r:id="rId4"/>
+              </a:rPr>
+              <a:t>github.com/tylertrephan/qt-multithreading-tutorial</a:t>
+            </a:r>
+            <a:r>
+              <a:rPr lang="en-US" dirty="0" smtClean="0"/>
+              <a:t> </a:t>
+            </a:r>
+            <a:endParaRPr lang="en-US" dirty="0"/>
           </a:p>
         </p:txBody>
       </p:sp>
@@ -9328,13 +12082,23 @@
             </a:r>
             <a:r>
               <a:rPr lang="en-US" dirty="0" smtClean="0"/>
-              <a:t> (“cute”) is cross-platform application framework</a:t>
-            </a:r>
-          </a:p>
-          <a:p>
+              <a:t> (“cute”) </a:t>
+            </a:r>
             <a:r>
               <a:rPr lang="en-US" dirty="0" smtClean="0"/>
-              <a:t>Provides custom C++ extensions to easily develop code for multiple platforms</a:t>
+              <a:t>is a </a:t>
+            </a:r>
+            <a:r>
+              <a:rPr lang="en-US" dirty="0" smtClean="0"/>
+              <a:t>cross-platform application </a:t>
+            </a:r>
+            <a:r>
+              <a:rPr lang="en-US" dirty="0" smtClean="0"/>
+              <a:t>framework that provides </a:t>
+            </a:r>
+            <a:r>
+              <a:rPr lang="en-US" dirty="0" smtClean="0"/>
+              <a:t>custom C++ extensions to easily develop code for multiple platforms</a:t>
             </a:r>
           </a:p>
           <a:p>
@@ -9468,13 +12232,30 @@
             </a:r>
             <a:r>
               <a:rPr lang="en-US" dirty="0" smtClean="0"/>
-              <a:t> 5.7 provides multiple “multithreading technologies”</a:t>
-            </a:r>
-          </a:p>
-          <a:p>
+              <a:t> 5.7 provides </a:t>
+            </a:r>
             <a:r>
               <a:rPr lang="en-US" dirty="0" smtClean="0"/>
-              <a:t>Each technology is at a different level of abstraction</a:t>
+              <a:t>multiple “multithreading technologies</a:t>
+            </a:r>
+            <a:r>
+              <a:rPr lang="en-US" dirty="0" smtClean="0"/>
+              <a:t>”</a:t>
+            </a:r>
+            <a:endParaRPr lang="en-US" dirty="0" smtClean="0"/>
+          </a:p>
+          <a:p>
+            <a:r>
+              <a:rPr lang="en-US" dirty="0" smtClean="0"/>
+              <a:t>Each technology is at a different level </a:t>
+            </a:r>
+            <a:r>
+              <a:rPr lang="en-US" dirty="0" smtClean="0"/>
+              <a:t>of threading </a:t>
+            </a:r>
+            <a:r>
+              <a:rPr lang="en-US" dirty="0" smtClean="0"/>
+              <a:t>abstraction</a:t>
             </a:r>
           </a:p>
           <a:p>
@@ -9585,7 +12366,7 @@
         </p:blipFill>
         <p:spPr>
           <a:xfrm>
-            <a:off x="1082845" y="1995488"/>
+            <a:off x="1830372" y="1567685"/>
             <a:ext cx="8531253" cy="4553902"/>
           </a:xfrm>
         </p:spPr>
@@ -9693,7 +12474,7 @@
         </p:blipFill>
         <p:spPr>
           <a:xfrm>
-            <a:off x="1082845" y="1995488"/>
+            <a:off x="1830372" y="1548680"/>
             <a:ext cx="8531253" cy="4553902"/>
           </a:xfrm>
         </p:spPr>
@@ -9725,7 +12506,7 @@
         </p:nvSpPr>
         <p:spPr>
           <a:xfrm>
-            <a:off x="2992581" y="2182090"/>
+            <a:off x="3719944" y="1972469"/>
             <a:ext cx="1132609" cy="4010891"/>
           </a:xfrm>
           <a:prstGeom prst="ellipse">
@@ -9817,86 +12598,92 @@
           <a:p>
             <a:r>
               <a:rPr lang="en-US" dirty="0" smtClean="0"/>
-              <a:t>So why </a:t>
+              <a:t>So why QThread?</a:t>
+            </a:r>
+            <a:endParaRPr lang="en-US" dirty="0"/>
+          </a:p>
+        </p:txBody>
+      </p:sp>
+      <p:sp>
+        <p:nvSpPr>
+          <p:cNvPr id="3" name="Content Placeholder 2"/>
+          <p:cNvSpPr>
+            <a:spLocks noGrp="1"/>
+          </p:cNvSpPr>
+          <p:nvPr>
+            <p:ph idx="1"/>
+          </p:nvPr>
+        </p:nvSpPr>
+        <p:spPr/>
+        <p:txBody>
+          <a:bodyPr/>
+          <a:lstStyle/>
+          <a:p>
+            <a:r>
+              <a:rPr lang="en-US" dirty="0" smtClean="0"/>
+              <a:t>Platform independent</a:t>
+            </a:r>
+          </a:p>
+          <a:p>
+            <a:r>
+              <a:rPr lang="en-US" dirty="0" smtClean="0"/>
+              <a:t>Lowest level </a:t>
             </a:r>
             <a:r>
               <a:rPr lang="en-US" dirty="0" err="1" smtClean="0"/>
-              <a:t>QThread</a:t>
+              <a:t>Qt</a:t>
             </a:r>
             <a:r>
               <a:rPr lang="en-US" dirty="0" smtClean="0"/>
-              <a:t>?</a:t>
+              <a:t> threading abstraction which provides </a:t>
+            </a:r>
+            <a:r>
+              <a:rPr lang="en-US" dirty="0" smtClean="0"/>
+              <a:t>the most power and flexibility </a:t>
+            </a:r>
+            <a:r>
+              <a:rPr lang="en-US" dirty="0" smtClean="0"/>
+              <a:t>for </a:t>
+            </a:r>
+            <a:r>
+              <a:rPr lang="en-US" dirty="0" smtClean="0"/>
+              <a:t>development</a:t>
             </a:r>
             <a:endParaRPr lang="en-US" dirty="0"/>
           </a:p>
-        </p:txBody>
-      </p:sp>
-      <p:sp>
-        <p:nvSpPr>
-          <p:cNvPr id="3" name="Content Placeholder 2"/>
-          <p:cNvSpPr>
-            <a:spLocks noGrp="1"/>
-          </p:cNvSpPr>
-          <p:nvPr>
-            <p:ph idx="1"/>
-          </p:nvPr>
-        </p:nvSpPr>
-        <p:spPr/>
-        <p:txBody>
-          <a:bodyPr/>
-          <a:lstStyle/>
-          <a:p>
+          <a:p>
+            <a:r>
+              <a:rPr lang="en-US" dirty="0"/>
+              <a:t>E</a:t>
+            </a:r>
             <a:r>
               <a:rPr lang="en-US" dirty="0" smtClean="0"/>
-              <a:t>It provides the most power and flexibility for a developer</a:t>
-            </a:r>
-          </a:p>
-          <a:p>
+              <a:t>asy to manage</a:t>
+            </a:r>
+            <a:endParaRPr lang="en-US" dirty="0" smtClean="0"/>
+          </a:p>
+          <a:p>
+            <a:pPr lvl="1"/>
+            <a:r>
+              <a:rPr lang="en-US" dirty="0"/>
+              <a:t>S</a:t>
+            </a:r>
             <a:r>
               <a:rPr lang="en-US" dirty="0" smtClean="0"/>
-              <a:t>In time critical programming, this power and flexibility is vital to taking advantage of </a:t>
-            </a:r>
-            <a:r>
-              <a:rPr lang="en-US" dirty="0" err="1" smtClean="0"/>
-              <a:t>Qt’s</a:t>
-            </a:r>
+              <a:t>et thread’s priority</a:t>
+            </a:r>
+          </a:p>
+          <a:p>
+            <a:pPr lvl="1"/>
             <a:r>
               <a:rPr lang="en-US" dirty="0" smtClean="0"/>
-              <a:t> multithreading ability</a:t>
-            </a:r>
+              <a:t>Communicate using Signals and Slots</a:t>
+            </a:r>
+            <a:endParaRPr lang="en-US" dirty="0" smtClean="0"/>
           </a:p>
           <a:p>
             <a:pPr lvl="1"/>
-            <a:r>
-              <a:rPr lang="en-US" dirty="0"/>
-              <a:t>Manage thread creation and </a:t>
-            </a:r>
-            <a:r>
-              <a:rPr lang="en-US" dirty="0" smtClean="0"/>
-              <a:t>destruction</a:t>
-            </a:r>
-          </a:p>
-          <a:p>
-            <a:pPr lvl="1"/>
-            <a:r>
-              <a:rPr lang="en-US" dirty="0" smtClean="0"/>
-              <a:t>Ability to set a </a:t>
-            </a:r>
-            <a:r>
-              <a:rPr lang="en-US" dirty="0"/>
-              <a:t>t</a:t>
-            </a:r>
-            <a:r>
-              <a:rPr lang="en-US" dirty="0" smtClean="0"/>
-              <a:t>hread’s priority</a:t>
-            </a:r>
-          </a:p>
-          <a:p>
-            <a:pPr lvl="1"/>
-            <a:r>
-              <a:rPr lang="en-US" dirty="0" smtClean="0"/>
-              <a:t>Schedule threads to a specific core</a:t>
-            </a:r>
+            <a:endParaRPr lang="en-US" dirty="0" smtClean="0"/>
           </a:p>
           <a:p>
             <a:pPr lvl="1"/>
@@ -9976,7 +12763,7 @@
           <a:lstStyle/>
           <a:p>
             <a:r>
-              <a:rPr lang="en-US" dirty="0" err="1" smtClean="0"/>
+              <a:rPr lang="en-US" dirty="0" smtClean="0"/>
               <a:t>QThread</a:t>
             </a:r>
             <a:endParaRPr lang="en-US" dirty="0"/>
@@ -10000,41 +12787,40 @@
           <a:p>
             <a:r>
               <a:rPr lang="en-US" dirty="0" smtClean="0"/>
-              <a:t>A </a:t>
-            </a:r>
-            <a:r>
-              <a:rPr lang="en-US" dirty="0" err="1" smtClean="0"/>
-              <a:t>QThread</a:t>
+              <a:t>A QThread object manages </a:t>
+            </a:r>
+            <a:r>
+              <a:rPr lang="en-US" dirty="0"/>
+              <a:t>a</a:t>
             </a:r>
             <a:r>
               <a:rPr lang="en-US" dirty="0" smtClean="0"/>
-              <a:t> object manages on thread of control within your program</a:t>
-            </a:r>
-          </a:p>
-          <a:p>
+              <a:t> </a:t>
+            </a:r>
             <a:r>
               <a:rPr lang="en-US" dirty="0" smtClean="0"/>
-              <a:t>Two ways to use a </a:t>
-            </a:r>
-            <a:r>
-              <a:rPr lang="en-US" dirty="0" err="1" smtClean="0"/>
-              <a:t>QThread</a:t>
-            </a:r>
-            <a:endParaRPr lang="en-US" dirty="0" smtClean="0"/>
+              <a:t>thread of control within your program</a:t>
+            </a:r>
+          </a:p>
+          <a:p>
+            <a:r>
+              <a:rPr lang="en-US" dirty="0" smtClean="0"/>
+              <a:t>Two ways to use a QThread</a:t>
+            </a:r>
           </a:p>
           <a:p>
             <a:pPr lvl="1"/>
             <a:r>
               <a:rPr lang="en-US" dirty="0"/>
-              <a:t>Create a subclass of </a:t>
-            </a:r>
-            <a:r>
-              <a:rPr lang="en-US" dirty="0" err="1"/>
-              <a:t>Qthread</a:t>
+              <a:t>Create </a:t>
+            </a:r>
+            <a:r>
+              <a:rPr lang="en-US" dirty="0" smtClean="0"/>
+              <a:t>a QThread subclass </a:t>
             </a:r>
             <a:r>
               <a:rPr lang="en-US" dirty="0"/>
-              <a:t> and </a:t>
+              <a:t>and </a:t>
             </a:r>
             <a:r>
               <a:rPr lang="en-US" dirty="0" err="1"/>
@@ -10048,7 +12834,6 @@
               <a:rPr lang="en-US" dirty="0" smtClean="0"/>
               <a:t>behavior</a:t>
             </a:r>
-            <a:endParaRPr lang="en-US" dirty="0" smtClean="0"/>
           </a:p>
           <a:p>
             <a:pPr lvl="1"/>
@@ -10065,14 +12850,10 @@
               <a:t> on a </a:t>
             </a:r>
             <a:r>
-              <a:rPr lang="en-US" dirty="0" err="1" smtClean="0"/>
-              <a:t>Qthread</a:t>
+              <a:rPr lang="en-US" dirty="0" smtClean="0"/>
+              <a:t>QThread</a:t>
             </a:r>
             <a:endParaRPr lang="en-US" dirty="0" smtClean="0"/>
-          </a:p>
-          <a:p>
-            <a:pPr lvl="1"/>
-            <a:endParaRPr lang="en-US" dirty="0"/>
           </a:p>
         </p:txBody>
       </p:sp>
@@ -10148,12 +12929,8 @@
           <a:lstStyle/>
           <a:p>
             <a:r>
-              <a:rPr lang="en-US" dirty="0" err="1" smtClean="0"/>
-              <a:t>QThread</a:t>
-            </a:r>
-            <a:r>
               <a:rPr lang="en-US" dirty="0" smtClean="0"/>
-              <a:t> Subclass</a:t>
+              <a:t>QThread Subclass</a:t>
             </a:r>
             <a:endParaRPr lang="en-US" dirty="0"/>
           </a:p>
@@ -10176,13 +12953,8 @@
           <a:p>
             <a:r>
               <a:rPr lang="en-US" dirty="0" smtClean="0"/>
-              <a:t>Create a class that inherits from </a:t>
-            </a:r>
-            <a:r>
-              <a:rPr lang="en-US" dirty="0" err="1" smtClean="0"/>
-              <a:t>QThread</a:t>
-            </a:r>
-            <a:endParaRPr lang="en-US" dirty="0" smtClean="0"/>
+              <a:t>Create a class that inherits from QThread</a:t>
+            </a:r>
           </a:p>
           <a:p>
             <a:r>
@@ -10203,21 +12975,25 @@
             </a:r>
             <a:r>
               <a:rPr lang="en-US" dirty="0" smtClean="0"/>
-              <a:t> run() function</a:t>
-            </a:r>
-          </a:p>
-          <a:p>
+              <a:t> run() </a:t>
+            </a:r>
             <a:r>
               <a:rPr lang="en-US" dirty="0" smtClean="0"/>
-              <a:t>Now, when you start your </a:t>
-            </a:r>
-            <a:r>
-              <a:rPr lang="en-US" dirty="0" err="1" smtClean="0"/>
-              <a:t>QThread</a:t>
+              <a:t>function</a:t>
+            </a:r>
+          </a:p>
+          <a:p>
+            <a:r>
+              <a:rPr lang="en-US" dirty="0"/>
+              <a:t>W</a:t>
             </a:r>
             <a:r>
               <a:rPr lang="en-US" dirty="0" smtClean="0"/>
-              <a:t> subclass, the functionality implemented in the run() function will execute on your new thread</a:t>
+              <a:t>hen </a:t>
+            </a:r>
+            <a:r>
+              <a:rPr lang="en-US" dirty="0" smtClean="0"/>
+              <a:t>you start your QThread subclass, the functionality implemented in the run() function will execute on your new thread</a:t>
             </a:r>
             <a:endParaRPr lang="en-US" dirty="0"/>
           </a:p>

</xml_diff>